<commit_message>
Update Presentation - Usability Tests.pptx
</commit_message>
<xml_diff>
--- a/Presentation - Usability Tests.pptx
+++ b/Presentation - Usability Tests.pptx
@@ -5,19 +5,23 @@
     <p:sldMasterId id="2147483648" r:id="rId1"/>
   </p:sldMasterIdLst>
   <p:notesMasterIdLst>
-    <p:notesMasterId r:id="rId9"/>
+    <p:notesMasterId r:id="rId13"/>
   </p:notesMasterIdLst>
   <p:handoutMasterIdLst>
-    <p:handoutMasterId r:id="rId10"/>
+    <p:handoutMasterId r:id="rId14"/>
   </p:handoutMasterIdLst>
   <p:sldIdLst>
     <p:sldId id="256" r:id="rId2"/>
     <p:sldId id="271" r:id="rId3"/>
-    <p:sldId id="272" r:id="rId4"/>
-    <p:sldId id="275" r:id="rId5"/>
-    <p:sldId id="273" r:id="rId6"/>
-    <p:sldId id="274" r:id="rId7"/>
-    <p:sldId id="270" r:id="rId8"/>
+    <p:sldId id="277" r:id="rId4"/>
+    <p:sldId id="276" r:id="rId5"/>
+    <p:sldId id="278" r:id="rId6"/>
+    <p:sldId id="279" r:id="rId7"/>
+    <p:sldId id="280" r:id="rId8"/>
+    <p:sldId id="281" r:id="rId9"/>
+    <p:sldId id="275" r:id="rId10"/>
+    <p:sldId id="273" r:id="rId11"/>
+    <p:sldId id="270" r:id="rId12"/>
   </p:sldIdLst>
   <p:sldSz cx="12192000" cy="6858000"/>
   <p:notesSz cx="6858000" cy="9144000"/>
@@ -222,7 +226,7 @@
           <a:p>
             <a:fld id="{760FB032-AF6A-4EC1-AFF4-5FB0AA9B2B9A}" type="datetimeFigureOut">
               <a:rPr lang="en-CH" smtClean="0"/>
-              <a:t>05/01/2019</a:t>
+              <a:t>05/02/2019</a:t>
             </a:fld>
             <a:endParaRPr lang="en-CH"/>
           </a:p>
@@ -404,7 +408,7 @@
           <a:p>
             <a:fld id="{0E5E4DA0-0FE2-4A19-8CB9-8173DD469D30}" type="datetimeFigureOut">
               <a:rPr lang="en-CH" smtClean="0"/>
-              <a:t>05/01/2019</a:t>
+              <a:t>05/02/2019</a:t>
             </a:fld>
             <a:endParaRPr lang="en-CH"/>
           </a:p>
@@ -780,6 +784,125 @@
 </p:notes>
 </file>
 
+<file path=ppt/notesSlides/notesSlide10.xml><?xml version="1.0" encoding="utf-8"?>
+<p:notes xmlns:a="http://schemas.openxmlformats.org/drawingml/2006/main" xmlns:r="http://schemas.openxmlformats.org/officeDocument/2006/relationships" xmlns:p="http://schemas.openxmlformats.org/presentationml/2006/main">
+  <p:cSld>
+    <p:spTree>
+      <p:nvGrpSpPr>
+        <p:cNvPr id="1" name=""/>
+        <p:cNvGrpSpPr/>
+        <p:nvPr/>
+      </p:nvGrpSpPr>
+      <p:grpSpPr>
+        <a:xfrm>
+          <a:off x="0" y="0"/>
+          <a:ext cx="0" cy="0"/>
+          <a:chOff x="0" y="0"/>
+          <a:chExt cx="0" cy="0"/>
+        </a:xfrm>
+      </p:grpSpPr>
+      <p:sp>
+        <p:nvSpPr>
+          <p:cNvPr id="2" name="Slide Image Placeholder 1"/>
+          <p:cNvSpPr>
+            <a:spLocks noGrp="1" noRot="1" noChangeAspect="1"/>
+          </p:cNvSpPr>
+          <p:nvPr>
+            <p:ph type="sldImg"/>
+          </p:nvPr>
+        </p:nvSpPr>
+        <p:spPr/>
+      </p:sp>
+      <p:sp>
+        <p:nvSpPr>
+          <p:cNvPr id="3" name="Notes Placeholder 2"/>
+          <p:cNvSpPr>
+            <a:spLocks noGrp="1"/>
+          </p:cNvSpPr>
+          <p:nvPr>
+            <p:ph type="body" idx="1"/>
+          </p:nvPr>
+        </p:nvSpPr>
+        <p:spPr/>
+        <p:txBody>
+          <a:bodyPr/>
+          <a:lstStyle/>
+          <a:p>
+            <a:pPr marL="228600" indent="-228600">
+              <a:buAutoNum type="arabicParenR"/>
+            </a:pPr>
+            <a:r>
+              <a:rPr lang="de-CH" dirty="0"/>
+              <a:t>Damit sich der Spieler besser zurechtfindet</a:t>
+            </a:r>
+          </a:p>
+          <a:p>
+            <a:pPr marL="228600" indent="-228600">
+              <a:buAutoNum type="arabicParenR"/>
+            </a:pPr>
+            <a:endParaRPr lang="en-CH" dirty="0"/>
+          </a:p>
+        </p:txBody>
+      </p:sp>
+      <p:sp>
+        <p:nvSpPr>
+          <p:cNvPr id="4" name="Header Placeholder 3"/>
+          <p:cNvSpPr>
+            <a:spLocks noGrp="1"/>
+          </p:cNvSpPr>
+          <p:nvPr>
+            <p:ph type="hdr" sz="quarter"/>
+          </p:nvPr>
+        </p:nvSpPr>
+        <p:spPr/>
+        <p:txBody>
+          <a:bodyPr/>
+          <a:lstStyle/>
+          <a:p>
+            <a:r>
+              <a:rPr lang="de-CH"/>
+              <a:t>Presentation 1</a:t>
+            </a:r>
+            <a:endParaRPr lang="en-CH"/>
+          </a:p>
+        </p:txBody>
+      </p:sp>
+      <p:sp>
+        <p:nvSpPr>
+          <p:cNvPr id="5" name="Slide Number Placeholder 4"/>
+          <p:cNvSpPr>
+            <a:spLocks noGrp="1"/>
+          </p:cNvSpPr>
+          <p:nvPr>
+            <p:ph type="sldNum" sz="quarter" idx="5"/>
+          </p:nvPr>
+        </p:nvSpPr>
+        <p:spPr/>
+        <p:txBody>
+          <a:bodyPr/>
+          <a:lstStyle/>
+          <a:p>
+            <a:fld id="{86D2B2B0-DFA4-4FD6-B30E-279208410810}" type="slidenum">
+              <a:rPr lang="en-CH" smtClean="0"/>
+              <a:t>10</a:t>
+            </a:fld>
+            <a:endParaRPr lang="en-CH"/>
+          </a:p>
+        </p:txBody>
+      </p:sp>
+    </p:spTree>
+    <p:extLst>
+      <p:ext uri="{BB962C8B-B14F-4D97-AF65-F5344CB8AC3E}">
+        <p14:creationId xmlns:p14="http://schemas.microsoft.com/office/powerpoint/2010/main" val="629107766"/>
+      </p:ext>
+    </p:extLst>
+  </p:cSld>
+  <p:clrMapOvr>
+    <a:masterClrMapping/>
+  </p:clrMapOvr>
+</p:notes>
+</file>
+
 <file path=ppt/notesSlides/notesSlide2.xml><?xml version="1.0" encoding="utf-8"?>
 <p:notes xmlns:a="http://schemas.openxmlformats.org/drawingml/2006/main" xmlns:r="http://schemas.openxmlformats.org/officeDocument/2006/relationships" xmlns:p="http://schemas.openxmlformats.org/presentationml/2006/main">
   <p:cSld>
@@ -931,6 +1054,10 @@
           <a:bodyPr/>
           <a:lstStyle/>
           <a:p>
+            <a:r>
+              <a:rPr lang="de-CH" dirty="0"/>
+              <a:t>Ohne Einführung, um zu sehen, ob das Spiel intuitiv ist</a:t>
+            </a:r>
             <a:endParaRPr lang="en-CH" dirty="0"/>
           </a:p>
         </p:txBody>
@@ -984,7 +1111,7 @@
     </p:spTree>
     <p:extLst>
       <p:ext uri="{BB962C8B-B14F-4D97-AF65-F5344CB8AC3E}">
-        <p14:creationId xmlns:p14="http://schemas.microsoft.com/office/powerpoint/2010/main" val="3381470409"/>
+        <p14:creationId xmlns:p14="http://schemas.microsoft.com/office/powerpoint/2010/main" val="917901484"/>
       </p:ext>
     </p:extLst>
   </p:cSld>
@@ -1091,7 +1218,7 @@
     </p:spTree>
     <p:extLst>
       <p:ext uri="{BB962C8B-B14F-4D97-AF65-F5344CB8AC3E}">
-        <p14:creationId xmlns:p14="http://schemas.microsoft.com/office/powerpoint/2010/main" val="1199038476"/>
+        <p14:creationId xmlns:p14="http://schemas.microsoft.com/office/powerpoint/2010/main" val="3655962013"/>
       </p:ext>
     </p:extLst>
   </p:cSld>
@@ -1145,6 +1272,25 @@
           <a:bodyPr/>
           <a:lstStyle/>
           <a:p>
+            <a:r>
+              <a:rPr lang="de-CH" dirty="0"/>
+              <a:t>Bienenähnliche Partikel -&gt; Simulation von Bienen,  die um den Bienenstock fliegen</a:t>
+            </a:r>
+          </a:p>
+          <a:p>
+            <a:r>
+              <a:rPr lang="de-CH" dirty="0"/>
+              <a:t>-&gt; Mehr Dynamik in der Spielwelt</a:t>
+            </a:r>
+          </a:p>
+          <a:p>
+            <a:endParaRPr lang="de-CH" dirty="0"/>
+          </a:p>
+          <a:p>
+            <a:r>
+              <a:rPr lang="de-CH" dirty="0"/>
+              <a:t>Tutorial grundlegende Spielelemente, aber nicht allen. Der Spieler soll auch Dinge selbst erkunden. </a:t>
+            </a:r>
             <a:endParaRPr lang="en-CH" dirty="0"/>
           </a:p>
         </p:txBody>
@@ -1198,7 +1344,7 @@
     </p:spTree>
     <p:extLst>
       <p:ext uri="{BB962C8B-B14F-4D97-AF65-F5344CB8AC3E}">
-        <p14:creationId xmlns:p14="http://schemas.microsoft.com/office/powerpoint/2010/main" val="629107766"/>
+        <p14:creationId xmlns:p14="http://schemas.microsoft.com/office/powerpoint/2010/main" val="262193446"/>
       </p:ext>
     </p:extLst>
   </p:cSld>
@@ -1252,6 +1398,10 @@
           <a:bodyPr/>
           <a:lstStyle/>
           <a:p>
+            <a:r>
+              <a:rPr lang="de-CH" dirty="0"/>
+              <a:t>Eher Mittelmässiges Feedback bis schlechtes, da sehr viele Platzhalter</a:t>
+            </a:r>
             <a:endParaRPr lang="en-CH" dirty="0"/>
           </a:p>
         </p:txBody>
@@ -1305,7 +1455,346 @@
     </p:spTree>
     <p:extLst>
       <p:ext uri="{BB962C8B-B14F-4D97-AF65-F5344CB8AC3E}">
-        <p14:creationId xmlns:p14="http://schemas.microsoft.com/office/powerpoint/2010/main" val="1098657880"/>
+        <p14:creationId xmlns:p14="http://schemas.microsoft.com/office/powerpoint/2010/main" val="691945750"/>
+      </p:ext>
+    </p:extLst>
+  </p:cSld>
+  <p:clrMapOvr>
+    <a:masterClrMapping/>
+  </p:clrMapOvr>
+</p:notes>
+</file>
+
+<file path=ppt/notesSlides/notesSlide7.xml><?xml version="1.0" encoding="utf-8"?>
+<p:notes xmlns:a="http://schemas.openxmlformats.org/drawingml/2006/main" xmlns:r="http://schemas.openxmlformats.org/officeDocument/2006/relationships" xmlns:p="http://schemas.openxmlformats.org/presentationml/2006/main">
+  <p:cSld>
+    <p:spTree>
+      <p:nvGrpSpPr>
+        <p:cNvPr id="1" name=""/>
+        <p:cNvGrpSpPr/>
+        <p:nvPr/>
+      </p:nvGrpSpPr>
+      <p:grpSpPr>
+        <a:xfrm>
+          <a:off x="0" y="0"/>
+          <a:ext cx="0" cy="0"/>
+          <a:chOff x="0" y="0"/>
+          <a:chExt cx="0" cy="0"/>
+        </a:xfrm>
+      </p:grpSpPr>
+      <p:sp>
+        <p:nvSpPr>
+          <p:cNvPr id="2" name="Slide Image Placeholder 1"/>
+          <p:cNvSpPr>
+            <a:spLocks noGrp="1" noRot="1" noChangeAspect="1"/>
+          </p:cNvSpPr>
+          <p:nvPr>
+            <p:ph type="sldImg"/>
+          </p:nvPr>
+        </p:nvSpPr>
+        <p:spPr/>
+      </p:sp>
+      <p:sp>
+        <p:nvSpPr>
+          <p:cNvPr id="3" name="Notes Placeholder 2"/>
+          <p:cNvSpPr>
+            <a:spLocks noGrp="1"/>
+          </p:cNvSpPr>
+          <p:nvPr>
+            <p:ph type="body" idx="1"/>
+          </p:nvPr>
+        </p:nvSpPr>
+        <p:spPr/>
+        <p:txBody>
+          <a:bodyPr/>
+          <a:lstStyle/>
+          <a:p>
+            <a:r>
+              <a:rPr lang="de-CH" dirty="0"/>
+              <a:t>Noch verbesserungspotential</a:t>
+            </a:r>
+          </a:p>
+          <a:p>
+            <a:r>
+              <a:rPr lang="de-CH" dirty="0"/>
+              <a:t>-&gt; Graphiker von </a:t>
+            </a:r>
+            <a:r>
+              <a:rPr lang="de-CH" dirty="0" err="1"/>
+              <a:t>Abilium</a:t>
+            </a:r>
+            <a:r>
+              <a:rPr lang="de-CH" dirty="0"/>
+              <a:t> arbeitet zurzeit noch an Sprites für andere Jahreszeiten</a:t>
+            </a:r>
+            <a:endParaRPr lang="en-CH" dirty="0"/>
+          </a:p>
+        </p:txBody>
+      </p:sp>
+      <p:sp>
+        <p:nvSpPr>
+          <p:cNvPr id="4" name="Header Placeholder 3"/>
+          <p:cNvSpPr>
+            <a:spLocks noGrp="1"/>
+          </p:cNvSpPr>
+          <p:nvPr>
+            <p:ph type="hdr" sz="quarter"/>
+          </p:nvPr>
+        </p:nvSpPr>
+        <p:spPr/>
+        <p:txBody>
+          <a:bodyPr/>
+          <a:lstStyle/>
+          <a:p>
+            <a:r>
+              <a:rPr lang="de-CH"/>
+              <a:t>Presentation 1</a:t>
+            </a:r>
+            <a:endParaRPr lang="en-CH"/>
+          </a:p>
+        </p:txBody>
+      </p:sp>
+      <p:sp>
+        <p:nvSpPr>
+          <p:cNvPr id="5" name="Slide Number Placeholder 4"/>
+          <p:cNvSpPr>
+            <a:spLocks noGrp="1"/>
+          </p:cNvSpPr>
+          <p:nvPr>
+            <p:ph type="sldNum" sz="quarter" idx="5"/>
+          </p:nvPr>
+        </p:nvSpPr>
+        <p:spPr/>
+        <p:txBody>
+          <a:bodyPr/>
+          <a:lstStyle/>
+          <a:p>
+            <a:fld id="{86D2B2B0-DFA4-4FD6-B30E-279208410810}" type="slidenum">
+              <a:rPr lang="en-CH" smtClean="0"/>
+              <a:t>7</a:t>
+            </a:fld>
+            <a:endParaRPr lang="en-CH"/>
+          </a:p>
+        </p:txBody>
+      </p:sp>
+    </p:spTree>
+    <p:extLst>
+      <p:ext uri="{BB962C8B-B14F-4D97-AF65-F5344CB8AC3E}">
+        <p14:creationId xmlns:p14="http://schemas.microsoft.com/office/powerpoint/2010/main" val="1829133659"/>
+      </p:ext>
+    </p:extLst>
+  </p:cSld>
+  <p:clrMapOvr>
+    <a:masterClrMapping/>
+  </p:clrMapOvr>
+</p:notes>
+</file>
+
+<file path=ppt/notesSlides/notesSlide8.xml><?xml version="1.0" encoding="utf-8"?>
+<p:notes xmlns:a="http://schemas.openxmlformats.org/drawingml/2006/main" xmlns:r="http://schemas.openxmlformats.org/officeDocument/2006/relationships" xmlns:p="http://schemas.openxmlformats.org/presentationml/2006/main">
+  <p:cSld>
+    <p:spTree>
+      <p:nvGrpSpPr>
+        <p:cNvPr id="1" name=""/>
+        <p:cNvGrpSpPr/>
+        <p:nvPr/>
+      </p:nvGrpSpPr>
+      <p:grpSpPr>
+        <a:xfrm>
+          <a:off x="0" y="0"/>
+          <a:ext cx="0" cy="0"/>
+          <a:chOff x="0" y="0"/>
+          <a:chExt cx="0" cy="0"/>
+        </a:xfrm>
+      </p:grpSpPr>
+      <p:sp>
+        <p:nvSpPr>
+          <p:cNvPr id="2" name="Slide Image Placeholder 1"/>
+          <p:cNvSpPr>
+            <a:spLocks noGrp="1" noRot="1" noChangeAspect="1"/>
+          </p:cNvSpPr>
+          <p:nvPr>
+            <p:ph type="sldImg"/>
+          </p:nvPr>
+        </p:nvSpPr>
+        <p:spPr/>
+      </p:sp>
+      <p:sp>
+        <p:nvSpPr>
+          <p:cNvPr id="3" name="Notes Placeholder 2"/>
+          <p:cNvSpPr>
+            <a:spLocks noGrp="1"/>
+          </p:cNvSpPr>
+          <p:nvPr>
+            <p:ph type="body" idx="1"/>
+          </p:nvPr>
+        </p:nvSpPr>
+        <p:spPr/>
+        <p:txBody>
+          <a:bodyPr/>
+          <a:lstStyle/>
+          <a:p>
+            <a:endParaRPr lang="en-CH" dirty="0"/>
+          </a:p>
+        </p:txBody>
+      </p:sp>
+      <p:sp>
+        <p:nvSpPr>
+          <p:cNvPr id="4" name="Header Placeholder 3"/>
+          <p:cNvSpPr>
+            <a:spLocks noGrp="1"/>
+          </p:cNvSpPr>
+          <p:nvPr>
+            <p:ph type="hdr" sz="quarter"/>
+          </p:nvPr>
+        </p:nvSpPr>
+        <p:spPr/>
+        <p:txBody>
+          <a:bodyPr/>
+          <a:lstStyle/>
+          <a:p>
+            <a:r>
+              <a:rPr lang="de-CH"/>
+              <a:t>Presentation 1</a:t>
+            </a:r>
+            <a:endParaRPr lang="en-CH"/>
+          </a:p>
+        </p:txBody>
+      </p:sp>
+      <p:sp>
+        <p:nvSpPr>
+          <p:cNvPr id="5" name="Slide Number Placeholder 4"/>
+          <p:cNvSpPr>
+            <a:spLocks noGrp="1"/>
+          </p:cNvSpPr>
+          <p:nvPr>
+            <p:ph type="sldNum" sz="quarter" idx="5"/>
+          </p:nvPr>
+        </p:nvSpPr>
+        <p:spPr/>
+        <p:txBody>
+          <a:bodyPr/>
+          <a:lstStyle/>
+          <a:p>
+            <a:fld id="{86D2B2B0-DFA4-4FD6-B30E-279208410810}" type="slidenum">
+              <a:rPr lang="en-CH" smtClean="0"/>
+              <a:t>8</a:t>
+            </a:fld>
+            <a:endParaRPr lang="en-CH"/>
+          </a:p>
+        </p:txBody>
+      </p:sp>
+    </p:spTree>
+    <p:extLst>
+      <p:ext uri="{BB962C8B-B14F-4D97-AF65-F5344CB8AC3E}">
+        <p14:creationId xmlns:p14="http://schemas.microsoft.com/office/powerpoint/2010/main" val="3962195265"/>
+      </p:ext>
+    </p:extLst>
+  </p:cSld>
+  <p:clrMapOvr>
+    <a:masterClrMapping/>
+  </p:clrMapOvr>
+</p:notes>
+</file>
+
+<file path=ppt/notesSlides/notesSlide9.xml><?xml version="1.0" encoding="utf-8"?>
+<p:notes xmlns:a="http://schemas.openxmlformats.org/drawingml/2006/main" xmlns:r="http://schemas.openxmlformats.org/officeDocument/2006/relationships" xmlns:p="http://schemas.openxmlformats.org/presentationml/2006/main">
+  <p:cSld>
+    <p:spTree>
+      <p:nvGrpSpPr>
+        <p:cNvPr id="1" name=""/>
+        <p:cNvGrpSpPr/>
+        <p:nvPr/>
+      </p:nvGrpSpPr>
+      <p:grpSpPr>
+        <a:xfrm>
+          <a:off x="0" y="0"/>
+          <a:ext cx="0" cy="0"/>
+          <a:chOff x="0" y="0"/>
+          <a:chExt cx="0" cy="0"/>
+        </a:xfrm>
+      </p:grpSpPr>
+      <p:sp>
+        <p:nvSpPr>
+          <p:cNvPr id="2" name="Slide Image Placeholder 1"/>
+          <p:cNvSpPr>
+            <a:spLocks noGrp="1" noRot="1" noChangeAspect="1"/>
+          </p:cNvSpPr>
+          <p:nvPr>
+            <p:ph type="sldImg"/>
+          </p:nvPr>
+        </p:nvSpPr>
+        <p:spPr/>
+      </p:sp>
+      <p:sp>
+        <p:nvSpPr>
+          <p:cNvPr id="3" name="Notes Placeholder 2"/>
+          <p:cNvSpPr>
+            <a:spLocks noGrp="1"/>
+          </p:cNvSpPr>
+          <p:nvPr>
+            <p:ph type="body" idx="1"/>
+          </p:nvPr>
+        </p:nvSpPr>
+        <p:spPr/>
+        <p:txBody>
+          <a:bodyPr/>
+          <a:lstStyle/>
+          <a:p>
+            <a:endParaRPr lang="en-CH" dirty="0"/>
+          </a:p>
+        </p:txBody>
+      </p:sp>
+      <p:sp>
+        <p:nvSpPr>
+          <p:cNvPr id="4" name="Header Placeholder 3"/>
+          <p:cNvSpPr>
+            <a:spLocks noGrp="1"/>
+          </p:cNvSpPr>
+          <p:nvPr>
+            <p:ph type="hdr" sz="quarter"/>
+          </p:nvPr>
+        </p:nvSpPr>
+        <p:spPr/>
+        <p:txBody>
+          <a:bodyPr/>
+          <a:lstStyle/>
+          <a:p>
+            <a:r>
+              <a:rPr lang="de-CH"/>
+              <a:t>Presentation 1</a:t>
+            </a:r>
+            <a:endParaRPr lang="en-CH"/>
+          </a:p>
+        </p:txBody>
+      </p:sp>
+      <p:sp>
+        <p:nvSpPr>
+          <p:cNvPr id="5" name="Slide Number Placeholder 4"/>
+          <p:cNvSpPr>
+            <a:spLocks noGrp="1"/>
+          </p:cNvSpPr>
+          <p:nvPr>
+            <p:ph type="sldNum" sz="quarter" idx="5"/>
+          </p:nvPr>
+        </p:nvSpPr>
+        <p:spPr/>
+        <p:txBody>
+          <a:bodyPr/>
+          <a:lstStyle/>
+          <a:p>
+            <a:fld id="{86D2B2B0-DFA4-4FD6-B30E-279208410810}" type="slidenum">
+              <a:rPr lang="en-CH" smtClean="0"/>
+              <a:t>9</a:t>
+            </a:fld>
+            <a:endParaRPr lang="en-CH"/>
+          </a:p>
+        </p:txBody>
+      </p:sp>
+    </p:spTree>
+    <p:extLst>
+      <p:ext uri="{BB962C8B-B14F-4D97-AF65-F5344CB8AC3E}">
+        <p14:creationId xmlns:p14="http://schemas.microsoft.com/office/powerpoint/2010/main" val="1199038476"/>
       </p:ext>
     </p:extLst>
   </p:cSld>
@@ -1464,7 +1953,7 @@
           <a:p>
             <a:fld id="{FB238362-B331-4D0F-B6D7-F0ED0664A921}" type="datetime8">
               <a:rPr lang="en-CH" smtClean="0"/>
-              <a:t>05/01/2019 08:52</a:t>
+              <a:t>05/02/2019 10:17</a:t>
             </a:fld>
             <a:endParaRPr lang="en-CH"/>
           </a:p>
@@ -1664,7 +2153,7 @@
           <a:p>
             <a:fld id="{A1DBDD9C-F3FB-4EB2-B213-E60A93B10E5A}" type="datetime8">
               <a:rPr lang="en-CH" smtClean="0"/>
-              <a:t>05/01/2019 08:52</a:t>
+              <a:t>05/02/2019 10:17</a:t>
             </a:fld>
             <a:endParaRPr lang="en-CH"/>
           </a:p>
@@ -1874,7 +2363,7 @@
           <a:p>
             <a:fld id="{96D85514-3F07-40F0-A879-526C5B836E5A}" type="datetime8">
               <a:rPr lang="en-CH" smtClean="0"/>
-              <a:t>05/01/2019 08:52</a:t>
+              <a:t>05/02/2019 10:17</a:t>
             </a:fld>
             <a:endParaRPr lang="en-CH"/>
           </a:p>
@@ -2074,7 +2563,7 @@
           <a:p>
             <a:fld id="{40094631-EBBF-452A-A691-8426FB316D3E}" type="datetime8">
               <a:rPr lang="en-CH" smtClean="0"/>
-              <a:t>05/01/2019 08:52</a:t>
+              <a:t>05/02/2019 10:17</a:t>
             </a:fld>
             <a:endParaRPr lang="en-CH"/>
           </a:p>
@@ -2350,7 +2839,7 @@
           <a:p>
             <a:fld id="{F6251D90-C392-434B-9A0D-4D9100FF5E80}" type="datetime8">
               <a:rPr lang="en-CH" smtClean="0"/>
-              <a:t>05/01/2019 08:52</a:t>
+              <a:t>05/02/2019 10:17</a:t>
             </a:fld>
             <a:endParaRPr lang="en-CH"/>
           </a:p>
@@ -2618,7 +3107,7 @@
           <a:p>
             <a:fld id="{E919816F-CEF9-42E3-AD73-DC57B354679C}" type="datetime8">
               <a:rPr lang="en-CH" smtClean="0"/>
-              <a:t>05/01/2019 08:52</a:t>
+              <a:t>05/02/2019 10:17</a:t>
             </a:fld>
             <a:endParaRPr lang="en-CH"/>
           </a:p>
@@ -3033,7 +3522,7 @@
           <a:p>
             <a:fld id="{AECA476D-D7EC-4720-94FE-0B75859BE66D}" type="datetime8">
               <a:rPr lang="en-CH" smtClean="0"/>
-              <a:t>05/01/2019 08:52</a:t>
+              <a:t>05/02/2019 10:17</a:t>
             </a:fld>
             <a:endParaRPr lang="en-CH"/>
           </a:p>
@@ -3175,7 +3664,7 @@
           <a:p>
             <a:fld id="{87298E05-EF03-4E88-81BB-8F6B085D959D}" type="datetime8">
               <a:rPr lang="en-CH" smtClean="0"/>
-              <a:t>05/01/2019 08:52</a:t>
+              <a:t>05/02/2019 10:17</a:t>
             </a:fld>
             <a:endParaRPr lang="en-CH"/>
           </a:p>
@@ -3288,7 +3777,7 @@
           <a:p>
             <a:fld id="{2147AC96-EB67-4A32-A5C3-5C050A0A44F2}" type="datetime8">
               <a:rPr lang="en-CH" smtClean="0"/>
-              <a:t>05/01/2019 08:52</a:t>
+              <a:t>05/02/2019 10:17</a:t>
             </a:fld>
             <a:endParaRPr lang="en-CH"/>
           </a:p>
@@ -3601,7 +4090,7 @@
           <a:p>
             <a:fld id="{4E1B3287-2675-4AD2-9505-372AB6ACFB02}" type="datetime8">
               <a:rPr lang="en-CH" smtClean="0"/>
-              <a:t>05/01/2019 08:52</a:t>
+              <a:t>05/02/2019 10:17</a:t>
             </a:fld>
             <a:endParaRPr lang="en-CH"/>
           </a:p>
@@ -3890,7 +4379,7 @@
           <a:p>
             <a:fld id="{5DB7365C-FB2C-4519-BDEE-919386B009BC}" type="datetime8">
               <a:rPr lang="en-CH" smtClean="0"/>
-              <a:t>05/01/2019 08:52</a:t>
+              <a:t>05/02/2019 10:17</a:t>
             </a:fld>
             <a:endParaRPr lang="en-CH"/>
           </a:p>
@@ -4133,7 +4622,7 @@
           <a:p>
             <a:fld id="{979FB36E-BB51-4996-8D77-822AD4008CC0}" type="datetime8">
               <a:rPr lang="en-CH" smtClean="0"/>
-              <a:t>05/01/2019 08:52</a:t>
+              <a:t>05/02/2019 10:17</a:t>
             </a:fld>
             <a:endParaRPr lang="en-CH"/>
           </a:p>
@@ -4822,6 +5311,695 @@
 </p:sld>
 </file>
 
+<file path=ppt/slides/slide10.xml><?xml version="1.0" encoding="utf-8"?>
+<p:sld xmlns:a="http://schemas.openxmlformats.org/drawingml/2006/main" xmlns:r="http://schemas.openxmlformats.org/officeDocument/2006/relationships" xmlns:p="http://schemas.openxmlformats.org/presentationml/2006/main">
+  <p:cSld>
+    <p:spTree>
+      <p:nvGrpSpPr>
+        <p:cNvPr id="1" name=""/>
+        <p:cNvGrpSpPr/>
+        <p:nvPr/>
+      </p:nvGrpSpPr>
+      <p:grpSpPr>
+        <a:xfrm>
+          <a:off x="0" y="0"/>
+          <a:ext cx="0" cy="0"/>
+          <a:chOff x="0" y="0"/>
+          <a:chExt cx="0" cy="0"/>
+        </a:xfrm>
+      </p:grpSpPr>
+      <p:sp>
+        <p:nvSpPr>
+          <p:cNvPr id="20" name="Title 1">
+            <a:extLst>
+              <a:ext uri="{FF2B5EF4-FFF2-40B4-BE49-F238E27FC236}">
+                <a16:creationId xmlns:a16="http://schemas.microsoft.com/office/drawing/2014/main" id="{BA7DEFD2-952A-47AA-AB94-829BDDBDD9E4}"/>
+              </a:ext>
+            </a:extLst>
+          </p:cNvPr>
+          <p:cNvSpPr txBox="1">
+            <a:spLocks/>
+          </p:cNvSpPr>
+          <p:nvPr/>
+        </p:nvSpPr>
+        <p:spPr>
+          <a:xfrm>
+            <a:off x="1282147" y="474591"/>
+            <a:ext cx="9144000" cy="886033"/>
+          </a:xfrm>
+          <a:prstGeom prst="rect">
+            <a:avLst/>
+          </a:prstGeom>
+        </p:spPr>
+        <p:txBody>
+          <a:bodyPr vert="horz" lIns="91440" tIns="45720" rIns="91440" bIns="45720" rtlCol="0" anchor="b">
+            <a:normAutofit fontScale="92500"/>
+          </a:bodyPr>
+          <a:lstStyle>
+            <a:lvl1pPr algn="ctr" defTabSz="914400" rtl="0" eaLnBrk="1" latinLnBrk="0" hangingPunct="1">
+              <a:lnSpc>
+                <a:spcPct val="90000"/>
+              </a:lnSpc>
+              <a:spcBef>
+                <a:spcPct val="0"/>
+              </a:spcBef>
+              <a:buNone/>
+              <a:defRPr sz="6000" kern="1200">
+                <a:solidFill>
+                  <a:schemeClr val="tx1"/>
+                </a:solidFill>
+                <a:latin typeface="+mj-lt"/>
+                <a:ea typeface="+mj-ea"/>
+                <a:cs typeface="+mj-cs"/>
+              </a:defRPr>
+            </a:lvl1pPr>
+          </a:lstStyle>
+          <a:p>
+            <a:r>
+              <a:rPr lang="de-CH" sz="4800" dirty="0"/>
+              <a:t>Fazit – Was hat sich für uns geändert</a:t>
+            </a:r>
+            <a:endParaRPr lang="en-CH" sz="4800" dirty="0"/>
+          </a:p>
+        </p:txBody>
+      </p:sp>
+      <p:sp>
+        <p:nvSpPr>
+          <p:cNvPr id="21" name="Subtitle 2">
+            <a:extLst>
+              <a:ext uri="{FF2B5EF4-FFF2-40B4-BE49-F238E27FC236}">
+                <a16:creationId xmlns:a16="http://schemas.microsoft.com/office/drawing/2014/main" id="{8333B1ED-AB10-4243-A67B-CC404ABFDF61}"/>
+              </a:ext>
+            </a:extLst>
+          </p:cNvPr>
+          <p:cNvSpPr txBox="1">
+            <a:spLocks/>
+          </p:cNvSpPr>
+          <p:nvPr/>
+        </p:nvSpPr>
+        <p:spPr>
+          <a:xfrm>
+            <a:off x="1282146" y="1818719"/>
+            <a:ext cx="9751614" cy="2922246"/>
+          </a:xfrm>
+          <a:prstGeom prst="rect">
+            <a:avLst/>
+          </a:prstGeom>
+        </p:spPr>
+        <p:txBody>
+          <a:bodyPr vert="horz" lIns="91440" tIns="45720" rIns="91440" bIns="45720" rtlCol="0">
+            <a:normAutofit/>
+          </a:bodyPr>
+          <a:lstStyle>
+            <a:lvl1pPr marL="0" indent="0" algn="ctr" defTabSz="914400" rtl="0" eaLnBrk="1" latinLnBrk="0" hangingPunct="1">
+              <a:lnSpc>
+                <a:spcPct val="90000"/>
+              </a:lnSpc>
+              <a:spcBef>
+                <a:spcPts val="1000"/>
+              </a:spcBef>
+              <a:buFont typeface="Arial" panose="020B0604020202020204" pitchFamily="34" charset="0"/>
+              <a:buNone/>
+              <a:defRPr sz="2400" kern="1200">
+                <a:solidFill>
+                  <a:schemeClr val="tx1"/>
+                </a:solidFill>
+                <a:latin typeface="+mn-lt"/>
+                <a:ea typeface="+mn-ea"/>
+                <a:cs typeface="+mn-cs"/>
+              </a:defRPr>
+            </a:lvl1pPr>
+            <a:lvl2pPr marL="457200" indent="0" algn="ctr" defTabSz="914400" rtl="0" eaLnBrk="1" latinLnBrk="0" hangingPunct="1">
+              <a:lnSpc>
+                <a:spcPct val="90000"/>
+              </a:lnSpc>
+              <a:spcBef>
+                <a:spcPts val="500"/>
+              </a:spcBef>
+              <a:buFont typeface="Arial" panose="020B0604020202020204" pitchFamily="34" charset="0"/>
+              <a:buNone/>
+              <a:defRPr sz="2000" kern="1200">
+                <a:solidFill>
+                  <a:schemeClr val="tx1"/>
+                </a:solidFill>
+                <a:latin typeface="+mn-lt"/>
+                <a:ea typeface="+mn-ea"/>
+                <a:cs typeface="+mn-cs"/>
+              </a:defRPr>
+            </a:lvl2pPr>
+            <a:lvl3pPr marL="914400" indent="0" algn="ctr" defTabSz="914400" rtl="0" eaLnBrk="1" latinLnBrk="0" hangingPunct="1">
+              <a:lnSpc>
+                <a:spcPct val="90000"/>
+              </a:lnSpc>
+              <a:spcBef>
+                <a:spcPts val="500"/>
+              </a:spcBef>
+              <a:buFont typeface="Arial" panose="020B0604020202020204" pitchFamily="34" charset="0"/>
+              <a:buNone/>
+              <a:defRPr sz="1800" kern="1200">
+                <a:solidFill>
+                  <a:schemeClr val="tx1"/>
+                </a:solidFill>
+                <a:latin typeface="+mn-lt"/>
+                <a:ea typeface="+mn-ea"/>
+                <a:cs typeface="+mn-cs"/>
+              </a:defRPr>
+            </a:lvl3pPr>
+            <a:lvl4pPr marL="1371600" indent="0" algn="ctr" defTabSz="914400" rtl="0" eaLnBrk="1" latinLnBrk="0" hangingPunct="1">
+              <a:lnSpc>
+                <a:spcPct val="90000"/>
+              </a:lnSpc>
+              <a:spcBef>
+                <a:spcPts val="500"/>
+              </a:spcBef>
+              <a:buFont typeface="Arial" panose="020B0604020202020204" pitchFamily="34" charset="0"/>
+              <a:buNone/>
+              <a:defRPr sz="1600" kern="1200">
+                <a:solidFill>
+                  <a:schemeClr val="tx1"/>
+                </a:solidFill>
+                <a:latin typeface="+mn-lt"/>
+                <a:ea typeface="+mn-ea"/>
+                <a:cs typeface="+mn-cs"/>
+              </a:defRPr>
+            </a:lvl4pPr>
+            <a:lvl5pPr marL="1828800" indent="0" algn="ctr" defTabSz="914400" rtl="0" eaLnBrk="1" latinLnBrk="0" hangingPunct="1">
+              <a:lnSpc>
+                <a:spcPct val="90000"/>
+              </a:lnSpc>
+              <a:spcBef>
+                <a:spcPts val="500"/>
+              </a:spcBef>
+              <a:buFont typeface="Arial" panose="020B0604020202020204" pitchFamily="34" charset="0"/>
+              <a:buNone/>
+              <a:defRPr sz="1600" kern="1200">
+                <a:solidFill>
+                  <a:schemeClr val="tx1"/>
+                </a:solidFill>
+                <a:latin typeface="+mn-lt"/>
+                <a:ea typeface="+mn-ea"/>
+                <a:cs typeface="+mn-cs"/>
+              </a:defRPr>
+            </a:lvl5pPr>
+            <a:lvl6pPr marL="2286000" indent="0" algn="ctr" defTabSz="914400" rtl="0" eaLnBrk="1" latinLnBrk="0" hangingPunct="1">
+              <a:lnSpc>
+                <a:spcPct val="90000"/>
+              </a:lnSpc>
+              <a:spcBef>
+                <a:spcPts val="500"/>
+              </a:spcBef>
+              <a:buFont typeface="Arial" panose="020B0604020202020204" pitchFamily="34" charset="0"/>
+              <a:buNone/>
+              <a:defRPr sz="1600" kern="1200">
+                <a:solidFill>
+                  <a:schemeClr val="tx1"/>
+                </a:solidFill>
+                <a:latin typeface="+mn-lt"/>
+                <a:ea typeface="+mn-ea"/>
+                <a:cs typeface="+mn-cs"/>
+              </a:defRPr>
+            </a:lvl6pPr>
+            <a:lvl7pPr marL="2743200" indent="0" algn="ctr" defTabSz="914400" rtl="0" eaLnBrk="1" latinLnBrk="0" hangingPunct="1">
+              <a:lnSpc>
+                <a:spcPct val="90000"/>
+              </a:lnSpc>
+              <a:spcBef>
+                <a:spcPts val="500"/>
+              </a:spcBef>
+              <a:buFont typeface="Arial" panose="020B0604020202020204" pitchFamily="34" charset="0"/>
+              <a:buNone/>
+              <a:defRPr sz="1600" kern="1200">
+                <a:solidFill>
+                  <a:schemeClr val="tx1"/>
+                </a:solidFill>
+                <a:latin typeface="+mn-lt"/>
+                <a:ea typeface="+mn-ea"/>
+                <a:cs typeface="+mn-cs"/>
+              </a:defRPr>
+            </a:lvl7pPr>
+            <a:lvl8pPr marL="3200400" indent="0" algn="ctr" defTabSz="914400" rtl="0" eaLnBrk="1" latinLnBrk="0" hangingPunct="1">
+              <a:lnSpc>
+                <a:spcPct val="90000"/>
+              </a:lnSpc>
+              <a:spcBef>
+                <a:spcPts val="500"/>
+              </a:spcBef>
+              <a:buFont typeface="Arial" panose="020B0604020202020204" pitchFamily="34" charset="0"/>
+              <a:buNone/>
+              <a:defRPr sz="1600" kern="1200">
+                <a:solidFill>
+                  <a:schemeClr val="tx1"/>
+                </a:solidFill>
+                <a:latin typeface="+mn-lt"/>
+                <a:ea typeface="+mn-ea"/>
+                <a:cs typeface="+mn-cs"/>
+              </a:defRPr>
+            </a:lvl8pPr>
+            <a:lvl9pPr marL="3657600" indent="0" algn="ctr" defTabSz="914400" rtl="0" eaLnBrk="1" latinLnBrk="0" hangingPunct="1">
+              <a:lnSpc>
+                <a:spcPct val="90000"/>
+              </a:lnSpc>
+              <a:spcBef>
+                <a:spcPts val="500"/>
+              </a:spcBef>
+              <a:buFont typeface="Arial" panose="020B0604020202020204" pitchFamily="34" charset="0"/>
+              <a:buNone/>
+              <a:defRPr sz="1600" kern="1200">
+                <a:solidFill>
+                  <a:schemeClr val="tx1"/>
+                </a:solidFill>
+                <a:latin typeface="+mn-lt"/>
+                <a:ea typeface="+mn-ea"/>
+                <a:cs typeface="+mn-cs"/>
+              </a:defRPr>
+            </a:lvl9pPr>
+          </a:lstStyle>
+          <a:p>
+            <a:pPr marL="342900" indent="-342900" algn="l">
+              <a:buFont typeface="Arial" panose="020B0604020202020204" pitchFamily="34" charset="0"/>
+              <a:buChar char="•"/>
+            </a:pPr>
+            <a:r>
+              <a:rPr lang="de-CH" dirty="0"/>
+              <a:t>Neuer Fokus auf Story / Einleitung</a:t>
+            </a:r>
+          </a:p>
+          <a:p>
+            <a:pPr marL="342900" indent="-342900" algn="l">
+              <a:buFont typeface="Arial" panose="020B0604020202020204" pitchFamily="34" charset="0"/>
+              <a:buChar char="•"/>
+            </a:pPr>
+            <a:r>
+              <a:rPr lang="de-CH" dirty="0"/>
+              <a:t>Bessere Platzhalter </a:t>
+            </a:r>
+          </a:p>
+          <a:p>
+            <a:pPr marL="342900" indent="-342900" algn="l">
+              <a:buFont typeface="Arial" panose="020B0604020202020204" pitchFamily="34" charset="0"/>
+              <a:buChar char="•"/>
+            </a:pPr>
+            <a:endParaRPr lang="de-CH" dirty="0"/>
+          </a:p>
+          <a:p>
+            <a:pPr marL="342900" indent="-342900" algn="l">
+              <a:buFont typeface="Arial" panose="020B0604020202020204" pitchFamily="34" charset="0"/>
+              <a:buChar char="•"/>
+            </a:pPr>
+            <a:r>
+              <a:rPr lang="de-CH" dirty="0"/>
+              <a:t>Dennoch:  Hauptfokus immer noch auf Spielinhalt </a:t>
+            </a:r>
+            <a:endParaRPr lang="en-CH" dirty="0"/>
+          </a:p>
+        </p:txBody>
+      </p:sp>
+      <p:sp>
+        <p:nvSpPr>
+          <p:cNvPr id="22" name="Slide Number Placeholder 3">
+            <a:extLst>
+              <a:ext uri="{FF2B5EF4-FFF2-40B4-BE49-F238E27FC236}">
+                <a16:creationId xmlns:a16="http://schemas.microsoft.com/office/drawing/2014/main" id="{30CC832F-1DF6-496C-AEBF-2FE46D26053A}"/>
+              </a:ext>
+            </a:extLst>
+          </p:cNvPr>
+          <p:cNvSpPr>
+            <a:spLocks noGrp="1"/>
+          </p:cNvSpPr>
+          <p:nvPr>
+            <p:ph type="sldNum" sz="quarter" idx="12"/>
+          </p:nvPr>
+        </p:nvSpPr>
+        <p:spPr>
+          <a:xfrm>
+            <a:off x="9054547" y="6386167"/>
+            <a:ext cx="2743200" cy="365125"/>
+          </a:xfrm>
+        </p:spPr>
+        <p:txBody>
+          <a:bodyPr/>
+          <a:lstStyle/>
+          <a:p>
+            <a:r>
+              <a:rPr lang="de-CH" sz="1800" dirty="0"/>
+              <a:t>Seite </a:t>
+            </a:r>
+            <a:fld id="{AA18215A-2065-42F3-B327-F66581BA1A17}" type="slidenum">
+              <a:rPr lang="en-CH" sz="1800" smtClean="0"/>
+              <a:t>10</a:t>
+            </a:fld>
+            <a:endParaRPr lang="en-CH" sz="1800" dirty="0"/>
+          </a:p>
+        </p:txBody>
+      </p:sp>
+      <p:pic>
+        <p:nvPicPr>
+          <p:cNvPr id="23" name="Picture 22">
+            <a:extLst>
+              <a:ext uri="{FF2B5EF4-FFF2-40B4-BE49-F238E27FC236}">
+                <a16:creationId xmlns:a16="http://schemas.microsoft.com/office/drawing/2014/main" id="{4E44345A-3A23-48FA-B43E-E7C6ED41FBEE}"/>
+              </a:ext>
+            </a:extLst>
+          </p:cNvPr>
+          <p:cNvPicPr>
+            <a:picLocks noChangeAspect="1"/>
+          </p:cNvPicPr>
+          <p:nvPr/>
+        </p:nvPicPr>
+        <p:blipFill rotWithShape="1">
+          <a:blip r:embed="rId3" cstate="hqprint">
+            <a:extLst>
+              <a:ext uri="{28A0092B-C50C-407E-A947-70E740481C1C}">
+                <a14:useLocalDpi xmlns:a14="http://schemas.microsoft.com/office/drawing/2010/main" val="0"/>
+              </a:ext>
+            </a:extLst>
+          </a:blip>
+          <a:srcRect l="12899" t="12899" r="12899" b="12899"/>
+          <a:stretch/>
+        </p:blipFill>
+        <p:spPr>
+          <a:xfrm flipH="1">
+            <a:off x="10426147" y="16496"/>
+            <a:ext cx="1765852" cy="1802225"/>
+          </a:xfrm>
+          <a:prstGeom prst="rect">
+            <a:avLst/>
+          </a:prstGeom>
+        </p:spPr>
+      </p:pic>
+      <p:sp>
+        <p:nvSpPr>
+          <p:cNvPr id="26" name="Slide Number Placeholder 3">
+            <a:extLst>
+              <a:ext uri="{FF2B5EF4-FFF2-40B4-BE49-F238E27FC236}">
+                <a16:creationId xmlns:a16="http://schemas.microsoft.com/office/drawing/2014/main" id="{0AE2B8A8-6598-4EDB-A8D4-B1AF00F1151E}"/>
+              </a:ext>
+            </a:extLst>
+          </p:cNvPr>
+          <p:cNvSpPr txBox="1">
+            <a:spLocks/>
+          </p:cNvSpPr>
+          <p:nvPr/>
+        </p:nvSpPr>
+        <p:spPr>
+          <a:xfrm>
+            <a:off x="0" y="-1027"/>
+            <a:ext cx="3170981" cy="365125"/>
+          </a:xfrm>
+          <a:prstGeom prst="rect">
+            <a:avLst/>
+          </a:prstGeom>
+        </p:spPr>
+        <p:txBody>
+          <a:bodyPr vert="horz" lIns="91440" tIns="45720" rIns="91440" bIns="45720" rtlCol="0" anchor="ctr"/>
+          <a:lstStyle>
+            <a:defPPr>
+              <a:defRPr lang="en-CH"/>
+            </a:defPPr>
+            <a:lvl1pPr marL="0" algn="r" defTabSz="914400" rtl="0" eaLnBrk="1" latinLnBrk="0" hangingPunct="1">
+              <a:defRPr sz="1200" kern="1200">
+                <a:solidFill>
+                  <a:schemeClr val="tx1">
+                    <a:tint val="75000"/>
+                  </a:schemeClr>
+                </a:solidFill>
+                <a:latin typeface="+mn-lt"/>
+                <a:ea typeface="+mn-ea"/>
+                <a:cs typeface="+mn-cs"/>
+              </a:defRPr>
+            </a:lvl1pPr>
+            <a:lvl2pPr marL="457200" algn="l" defTabSz="914400" rtl="0" eaLnBrk="1" latinLnBrk="0" hangingPunct="1">
+              <a:defRPr sz="1800" kern="1200">
+                <a:solidFill>
+                  <a:schemeClr val="tx1"/>
+                </a:solidFill>
+                <a:latin typeface="+mn-lt"/>
+                <a:ea typeface="+mn-ea"/>
+                <a:cs typeface="+mn-cs"/>
+              </a:defRPr>
+            </a:lvl2pPr>
+            <a:lvl3pPr marL="914400" algn="l" defTabSz="914400" rtl="0" eaLnBrk="1" latinLnBrk="0" hangingPunct="1">
+              <a:defRPr sz="1800" kern="1200">
+                <a:solidFill>
+                  <a:schemeClr val="tx1"/>
+                </a:solidFill>
+                <a:latin typeface="+mn-lt"/>
+                <a:ea typeface="+mn-ea"/>
+                <a:cs typeface="+mn-cs"/>
+              </a:defRPr>
+            </a:lvl3pPr>
+            <a:lvl4pPr marL="1371600" algn="l" defTabSz="914400" rtl="0" eaLnBrk="1" latinLnBrk="0" hangingPunct="1">
+              <a:defRPr sz="1800" kern="1200">
+                <a:solidFill>
+                  <a:schemeClr val="tx1"/>
+                </a:solidFill>
+                <a:latin typeface="+mn-lt"/>
+                <a:ea typeface="+mn-ea"/>
+                <a:cs typeface="+mn-cs"/>
+              </a:defRPr>
+            </a:lvl4pPr>
+            <a:lvl5pPr marL="1828800" algn="l" defTabSz="914400" rtl="0" eaLnBrk="1" latinLnBrk="0" hangingPunct="1">
+              <a:defRPr sz="1800" kern="1200">
+                <a:solidFill>
+                  <a:schemeClr val="tx1"/>
+                </a:solidFill>
+                <a:latin typeface="+mn-lt"/>
+                <a:ea typeface="+mn-ea"/>
+                <a:cs typeface="+mn-cs"/>
+              </a:defRPr>
+            </a:lvl5pPr>
+            <a:lvl6pPr marL="2286000" algn="l" defTabSz="914400" rtl="0" eaLnBrk="1" latinLnBrk="0" hangingPunct="1">
+              <a:defRPr sz="1800" kern="1200">
+                <a:solidFill>
+                  <a:schemeClr val="tx1"/>
+                </a:solidFill>
+                <a:latin typeface="+mn-lt"/>
+                <a:ea typeface="+mn-ea"/>
+                <a:cs typeface="+mn-cs"/>
+              </a:defRPr>
+            </a:lvl6pPr>
+            <a:lvl7pPr marL="2743200" algn="l" defTabSz="914400" rtl="0" eaLnBrk="1" latinLnBrk="0" hangingPunct="1">
+              <a:defRPr sz="1800" kern="1200">
+                <a:solidFill>
+                  <a:schemeClr val="tx1"/>
+                </a:solidFill>
+                <a:latin typeface="+mn-lt"/>
+                <a:ea typeface="+mn-ea"/>
+                <a:cs typeface="+mn-cs"/>
+              </a:defRPr>
+            </a:lvl7pPr>
+            <a:lvl8pPr marL="3200400" algn="l" defTabSz="914400" rtl="0" eaLnBrk="1" latinLnBrk="0" hangingPunct="1">
+              <a:defRPr sz="1800" kern="1200">
+                <a:solidFill>
+                  <a:schemeClr val="tx1"/>
+                </a:solidFill>
+                <a:latin typeface="+mn-lt"/>
+                <a:ea typeface="+mn-ea"/>
+                <a:cs typeface="+mn-cs"/>
+              </a:defRPr>
+            </a:lvl8pPr>
+            <a:lvl9pPr marL="3657600" algn="l" defTabSz="914400" rtl="0" eaLnBrk="1" latinLnBrk="0" hangingPunct="1">
+              <a:defRPr sz="1800" kern="1200">
+                <a:solidFill>
+                  <a:schemeClr val="tx1"/>
+                </a:solidFill>
+                <a:latin typeface="+mn-lt"/>
+                <a:ea typeface="+mn-ea"/>
+                <a:cs typeface="+mn-cs"/>
+              </a:defRPr>
+            </a:lvl9pPr>
+          </a:lstStyle>
+          <a:p>
+            <a:r>
+              <a:rPr lang="de-CH" sz="1800" dirty="0"/>
+              <a:t>Präsentation – Usability Tests</a:t>
+            </a:r>
+            <a:endParaRPr lang="en-CH" sz="1800" dirty="0"/>
+          </a:p>
+        </p:txBody>
+      </p:sp>
+    </p:spTree>
+    <p:extLst>
+      <p:ext uri="{BB962C8B-B14F-4D97-AF65-F5344CB8AC3E}">
+        <p14:creationId xmlns:p14="http://schemas.microsoft.com/office/powerpoint/2010/main" val="721238863"/>
+      </p:ext>
+    </p:extLst>
+  </p:cSld>
+  <p:clrMapOvr>
+    <a:masterClrMapping/>
+  </p:clrMapOvr>
+</p:sld>
+</file>
+
+<file path=ppt/slides/slide11.xml><?xml version="1.0" encoding="utf-8"?>
+<p:sld xmlns:a="http://schemas.openxmlformats.org/drawingml/2006/main" xmlns:r="http://schemas.openxmlformats.org/officeDocument/2006/relationships" xmlns:p="http://schemas.openxmlformats.org/presentationml/2006/main">
+  <p:cSld>
+    <p:spTree>
+      <p:nvGrpSpPr>
+        <p:cNvPr id="1" name=""/>
+        <p:cNvGrpSpPr/>
+        <p:nvPr/>
+      </p:nvGrpSpPr>
+      <p:grpSpPr>
+        <a:xfrm>
+          <a:off x="0" y="0"/>
+          <a:ext cx="0" cy="0"/>
+          <a:chOff x="0" y="0"/>
+          <a:chExt cx="0" cy="0"/>
+        </a:xfrm>
+      </p:grpSpPr>
+      <p:sp>
+        <p:nvSpPr>
+          <p:cNvPr id="2" name="Title 1">
+            <a:extLst>
+              <a:ext uri="{FF2B5EF4-FFF2-40B4-BE49-F238E27FC236}">
+                <a16:creationId xmlns:a16="http://schemas.microsoft.com/office/drawing/2014/main" id="{0E405776-8BA9-4C4E-8757-D28431CCF3E0}"/>
+              </a:ext>
+            </a:extLst>
+          </p:cNvPr>
+          <p:cNvSpPr>
+            <a:spLocks noGrp="1"/>
+          </p:cNvSpPr>
+          <p:nvPr>
+            <p:ph type="ctrTitle"/>
+          </p:nvPr>
+        </p:nvSpPr>
+        <p:spPr>
+          <a:xfrm>
+            <a:off x="1282147" y="474591"/>
+            <a:ext cx="9144000" cy="886033"/>
+          </a:xfrm>
+        </p:spPr>
+        <p:txBody>
+          <a:bodyPr>
+            <a:normAutofit/>
+          </a:bodyPr>
+          <a:lstStyle/>
+          <a:p>
+            <a:r>
+              <a:rPr lang="de-CH" sz="4800" dirty="0"/>
+              <a:t>Fragen/Diskussion</a:t>
+            </a:r>
+            <a:endParaRPr lang="en-CH" sz="4800" dirty="0"/>
+          </a:p>
+        </p:txBody>
+      </p:sp>
+      <p:sp>
+        <p:nvSpPr>
+          <p:cNvPr id="4" name="Slide Number Placeholder 3">
+            <a:extLst>
+              <a:ext uri="{FF2B5EF4-FFF2-40B4-BE49-F238E27FC236}">
+                <a16:creationId xmlns:a16="http://schemas.microsoft.com/office/drawing/2014/main" id="{93203F41-B8AC-41D4-A739-92BF6FA5069E}"/>
+              </a:ext>
+            </a:extLst>
+          </p:cNvPr>
+          <p:cNvSpPr>
+            <a:spLocks noGrp="1"/>
+          </p:cNvSpPr>
+          <p:nvPr>
+            <p:ph type="sldNum" sz="quarter" idx="12"/>
+          </p:nvPr>
+        </p:nvSpPr>
+        <p:spPr>
+          <a:xfrm>
+            <a:off x="9054547" y="6386167"/>
+            <a:ext cx="2743200" cy="365125"/>
+          </a:xfrm>
+        </p:spPr>
+        <p:txBody>
+          <a:bodyPr/>
+          <a:lstStyle/>
+          <a:p>
+            <a:r>
+              <a:rPr lang="de-CH" sz="1800" dirty="0"/>
+              <a:t>Seite </a:t>
+            </a:r>
+            <a:fld id="{AA18215A-2065-42F3-B327-F66581BA1A17}" type="slidenum">
+              <a:rPr lang="en-CH" sz="1800" smtClean="0"/>
+              <a:t>11</a:t>
+            </a:fld>
+            <a:endParaRPr lang="en-CH" sz="1800" dirty="0"/>
+          </a:p>
+        </p:txBody>
+      </p:sp>
+      <p:pic>
+        <p:nvPicPr>
+          <p:cNvPr id="6" name="Picture 5">
+            <a:extLst>
+              <a:ext uri="{FF2B5EF4-FFF2-40B4-BE49-F238E27FC236}">
+                <a16:creationId xmlns:a16="http://schemas.microsoft.com/office/drawing/2014/main" id="{02D8C762-0B4B-4BA0-B560-24801AB89C46}"/>
+              </a:ext>
+            </a:extLst>
+          </p:cNvPr>
+          <p:cNvPicPr>
+            <a:picLocks noChangeAspect="1"/>
+          </p:cNvPicPr>
+          <p:nvPr/>
+        </p:nvPicPr>
+        <p:blipFill rotWithShape="1">
+          <a:blip r:embed="rId2" cstate="hqprint">
+            <a:extLst>
+              <a:ext uri="{28A0092B-C50C-407E-A947-70E740481C1C}">
+                <a14:useLocalDpi xmlns:a14="http://schemas.microsoft.com/office/drawing/2010/main" val="0"/>
+              </a:ext>
+            </a:extLst>
+          </a:blip>
+          <a:srcRect l="12899" t="12899" r="12899" b="12899"/>
+          <a:stretch/>
+        </p:blipFill>
+        <p:spPr>
+          <a:xfrm flipH="1">
+            <a:off x="10426147" y="16496"/>
+            <a:ext cx="1765852" cy="1802225"/>
+          </a:xfrm>
+          <a:prstGeom prst="rect">
+            <a:avLst/>
+          </a:prstGeom>
+        </p:spPr>
+      </p:pic>
+      <p:pic>
+        <p:nvPicPr>
+          <p:cNvPr id="12" name="Grafik 11">
+            <a:extLst>
+              <a:ext uri="{FF2B5EF4-FFF2-40B4-BE49-F238E27FC236}">
+                <a16:creationId xmlns:a16="http://schemas.microsoft.com/office/drawing/2014/main" id="{136D509C-EA4C-44AE-A10D-BCB08991AA89}"/>
+              </a:ext>
+            </a:extLst>
+          </p:cNvPr>
+          <p:cNvPicPr>
+            <a:picLocks noChangeAspect="1"/>
+          </p:cNvPicPr>
+          <p:nvPr/>
+        </p:nvPicPr>
+        <p:blipFill>
+          <a:blip r:embed="rId3"/>
+          <a:stretch>
+            <a:fillRect/>
+          </a:stretch>
+        </p:blipFill>
+        <p:spPr>
+          <a:xfrm>
+            <a:off x="3324225" y="1818719"/>
+            <a:ext cx="5543550" cy="4495800"/>
+          </a:xfrm>
+          <a:prstGeom prst="rect">
+            <a:avLst/>
+          </a:prstGeom>
+        </p:spPr>
+      </p:pic>
+    </p:spTree>
+    <p:extLst>
+      <p:ext uri="{BB962C8B-B14F-4D97-AF65-F5344CB8AC3E}">
+        <p14:creationId xmlns:p14="http://schemas.microsoft.com/office/powerpoint/2010/main" val="3592599617"/>
+      </p:ext>
+    </p:extLst>
+  </p:cSld>
+  <p:clrMapOvr>
+    <a:masterClrMapping/>
+  </p:clrMapOvr>
+</p:sld>
+</file>
+
 <file path=ppt/slides/slide2.xml><?xml version="1.0" encoding="utf-8"?>
 <p:sld xmlns:a="http://schemas.openxmlformats.org/drawingml/2006/main" xmlns:r="http://schemas.openxmlformats.org/officeDocument/2006/relationships" xmlns:p="http://schemas.openxmlformats.org/presentationml/2006/main">
   <p:cSld>
@@ -4888,7 +6066,7 @@
           <a:p>
             <a:r>
               <a:rPr lang="de-CH" sz="4800" dirty="0"/>
-              <a:t>Vorgehen</a:t>
+              <a:t>Usability Tests</a:t>
             </a:r>
             <a:endParaRPr lang="en-CH" sz="4800" dirty="0"/>
           </a:p>
@@ -5092,7 +6270,15 @@
             </a:pPr>
             <a:r>
               <a:rPr lang="de-CH" dirty="0"/>
-              <a:t>Künftige Anwender</a:t>
+              <a:t>Fokus von uns und </a:t>
+            </a:r>
+            <a:r>
+              <a:rPr lang="de-CH" dirty="0" err="1"/>
+              <a:t>Abilium</a:t>
+            </a:r>
+            <a:r>
+              <a:rPr lang="de-CH" dirty="0"/>
+              <a:t> auf Programmierung von Spielfeatures</a:t>
             </a:r>
           </a:p>
           <a:p>
@@ -5102,8 +6288,13 @@
             </a:pPr>
             <a:r>
               <a:rPr lang="de-CH" dirty="0"/>
-              <a:t>Vorkenntnisse</a:t>
-            </a:r>
+              <a:t>Deshalb nur kurzes Usability </a:t>
+            </a:r>
+            <a:r>
+              <a:rPr lang="de-CH" dirty="0" err="1"/>
+              <a:t>Testing</a:t>
+            </a:r>
+            <a:endParaRPr lang="de-CH" dirty="0"/>
           </a:p>
           <a:p>
             <a:pPr marL="342900" indent="-342900" algn="l">
@@ -5112,19 +6303,35 @@
             </a:pPr>
             <a:r>
               <a:rPr lang="de-CH" dirty="0"/>
-              <a:t>Wer testest die Software?</a:t>
-            </a:r>
-          </a:p>
-          <a:p>
-            <a:pPr marL="342900" indent="-342900" algn="l">
+              <a:t>Ziel des Tests:</a:t>
+            </a:r>
+          </a:p>
+          <a:p>
+            <a:pPr marL="800100" lvl="1" indent="-342900" algn="l">
               <a:buFont typeface="Arial" panose="020B0604020202020204" pitchFamily="34" charset="0"/>
               <a:buChar char="•"/>
             </a:pPr>
             <a:r>
               <a:rPr lang="de-CH" dirty="0"/>
-              <a:t>Ablauf</a:t>
-            </a:r>
-            <a:endParaRPr lang="en-CH" dirty="0"/>
+              <a:t> Verbesserung UI</a:t>
+            </a:r>
+          </a:p>
+          <a:p>
+            <a:pPr marL="800100" lvl="1" indent="-342900" algn="l">
+              <a:buFont typeface="Arial" panose="020B0604020202020204" pitchFamily="34" charset="0"/>
+              <a:buChar char="•"/>
+            </a:pPr>
+            <a:r>
+              <a:rPr lang="de-CH" dirty="0"/>
+              <a:t> Fokus für nächste Iteration</a:t>
+            </a:r>
+          </a:p>
+          <a:p>
+            <a:pPr marL="800100" lvl="1" indent="-342900" algn="l">
+              <a:buFont typeface="Arial" panose="020B0604020202020204" pitchFamily="34" charset="0"/>
+              <a:buChar char="•"/>
+            </a:pPr>
+            <a:endParaRPr lang="de-CH" dirty="0"/>
           </a:p>
         </p:txBody>
       </p:sp>
@@ -5411,7 +6618,7 @@
           <a:p>
             <a:r>
               <a:rPr lang="de-CH" sz="4800" dirty="0"/>
-              <a:t>Auswertung von Antworten</a:t>
+              <a:t>Vorgehen</a:t>
             </a:r>
             <a:endParaRPr lang="en-CH" sz="4800" dirty="0"/>
           </a:p>
@@ -5433,7 +6640,7 @@
         </p:nvSpPr>
         <p:spPr>
           <a:xfrm>
-            <a:off x="1282146" y="1818719"/>
+            <a:off x="1282147" y="2069223"/>
             <a:ext cx="9751614" cy="2922246"/>
           </a:xfrm>
           <a:prstGeom prst="rect">
@@ -5613,7 +6820,30 @@
               <a:buFont typeface="Arial" panose="020B0604020202020204" pitchFamily="34" charset="0"/>
               <a:buChar char="•"/>
             </a:pPr>
-            <a:endParaRPr lang="en-CH" dirty="0"/>
+            <a:r>
+              <a:rPr lang="de-CH" dirty="0"/>
+              <a:t>Freunde spielen lassen</a:t>
+            </a:r>
+          </a:p>
+          <a:p>
+            <a:pPr marL="342900" indent="-342900" algn="l">
+              <a:buFont typeface="Arial" panose="020B0604020202020204" pitchFamily="34" charset="0"/>
+              <a:buChar char="•"/>
+            </a:pPr>
+            <a:r>
+              <a:rPr lang="de-CH" dirty="0"/>
+              <a:t>Ohne Einführung</a:t>
+            </a:r>
+          </a:p>
+          <a:p>
+            <a:pPr marL="342900" indent="-342900" algn="l">
+              <a:buFont typeface="Arial" panose="020B0604020202020204" pitchFamily="34" charset="0"/>
+              <a:buChar char="•"/>
+            </a:pPr>
+            <a:r>
+              <a:rPr lang="de-CH" dirty="0"/>
+              <a:t>Google Survey</a:t>
+            </a:r>
           </a:p>
         </p:txBody>
       </p:sp>
@@ -5824,7 +7054,7 @@
     </p:spTree>
     <p:extLst>
       <p:ext uri="{BB962C8B-B14F-4D97-AF65-F5344CB8AC3E}">
-        <p14:creationId xmlns:p14="http://schemas.microsoft.com/office/powerpoint/2010/main" val="1204427719"/>
+        <p14:creationId xmlns:p14="http://schemas.microsoft.com/office/powerpoint/2010/main" val="3570950316"/>
       </p:ext>
     </p:extLst>
   </p:cSld>
@@ -5899,8 +7129,36 @@
           </a:lstStyle>
           <a:p>
             <a:r>
+              <a:rPr lang="de-CH" sz="4800" dirty="0" err="1"/>
+              <a:t>Did</a:t>
+            </a:r>
+            <a:r>
               <a:rPr lang="de-CH" sz="4800" dirty="0"/>
-              <a:t>Unsere Beobachtungen</a:t>
+              <a:t> </a:t>
+            </a:r>
+            <a:r>
+              <a:rPr lang="de-CH" sz="4800" dirty="0" err="1"/>
+              <a:t>you</a:t>
+            </a:r>
+            <a:r>
+              <a:rPr lang="de-CH" sz="4800" dirty="0"/>
+              <a:t> </a:t>
+            </a:r>
+            <a:r>
+              <a:rPr lang="de-CH" sz="4800" dirty="0" err="1"/>
+              <a:t>have</a:t>
+            </a:r>
+            <a:r>
+              <a:rPr lang="de-CH" sz="4800" dirty="0"/>
+              <a:t> </a:t>
+            </a:r>
+            <a:r>
+              <a:rPr lang="de-CH" sz="4800" dirty="0" err="1"/>
+              <a:t>fun</a:t>
+            </a:r>
+            <a:r>
+              <a:rPr lang="de-CH" sz="4800" dirty="0"/>
+              <a:t>?</a:t>
             </a:r>
             <a:endParaRPr lang="en-CH" sz="4800" dirty="0"/>
           </a:p>
@@ -6310,10 +7568,210 @@
           </a:p>
         </p:txBody>
       </p:sp>
+      <p:sp>
+        <p:nvSpPr>
+          <p:cNvPr id="8" name="Subtitle 2">
+            <a:extLst>
+              <a:ext uri="{FF2B5EF4-FFF2-40B4-BE49-F238E27FC236}">
+                <a16:creationId xmlns:a16="http://schemas.microsoft.com/office/drawing/2014/main" id="{1831DB9A-371F-42E5-A5A0-5EA291AD09F6}"/>
+              </a:ext>
+            </a:extLst>
+          </p:cNvPr>
+          <p:cNvSpPr txBox="1">
+            <a:spLocks/>
+          </p:cNvSpPr>
+          <p:nvPr/>
+        </p:nvSpPr>
+        <p:spPr>
+          <a:xfrm>
+            <a:off x="1434546" y="1971118"/>
+            <a:ext cx="8802274" cy="3571037"/>
+          </a:xfrm>
+          <a:prstGeom prst="rect">
+            <a:avLst/>
+          </a:prstGeom>
+        </p:spPr>
+        <p:txBody>
+          <a:bodyPr vert="horz" lIns="91440" tIns="45720" rIns="91440" bIns="45720" rtlCol="0">
+            <a:normAutofit/>
+          </a:bodyPr>
+          <a:lstStyle>
+            <a:lvl1pPr marL="0" indent="0" algn="ctr" defTabSz="914400" rtl="0" eaLnBrk="1" latinLnBrk="0" hangingPunct="1">
+              <a:lnSpc>
+                <a:spcPct val="90000"/>
+              </a:lnSpc>
+              <a:spcBef>
+                <a:spcPts val="1000"/>
+              </a:spcBef>
+              <a:buFont typeface="Arial" panose="020B0604020202020204" pitchFamily="34" charset="0"/>
+              <a:buNone/>
+              <a:defRPr sz="2400" kern="1200">
+                <a:solidFill>
+                  <a:schemeClr val="tx1"/>
+                </a:solidFill>
+                <a:latin typeface="+mn-lt"/>
+                <a:ea typeface="+mn-ea"/>
+                <a:cs typeface="+mn-cs"/>
+              </a:defRPr>
+            </a:lvl1pPr>
+            <a:lvl2pPr marL="457200" indent="0" algn="ctr" defTabSz="914400" rtl="0" eaLnBrk="1" latinLnBrk="0" hangingPunct="1">
+              <a:lnSpc>
+                <a:spcPct val="90000"/>
+              </a:lnSpc>
+              <a:spcBef>
+                <a:spcPts val="500"/>
+              </a:spcBef>
+              <a:buFont typeface="Arial" panose="020B0604020202020204" pitchFamily="34" charset="0"/>
+              <a:buNone/>
+              <a:defRPr sz="2000" kern="1200">
+                <a:solidFill>
+                  <a:schemeClr val="tx1"/>
+                </a:solidFill>
+                <a:latin typeface="+mn-lt"/>
+                <a:ea typeface="+mn-ea"/>
+                <a:cs typeface="+mn-cs"/>
+              </a:defRPr>
+            </a:lvl2pPr>
+            <a:lvl3pPr marL="914400" indent="0" algn="ctr" defTabSz="914400" rtl="0" eaLnBrk="1" latinLnBrk="0" hangingPunct="1">
+              <a:lnSpc>
+                <a:spcPct val="90000"/>
+              </a:lnSpc>
+              <a:spcBef>
+                <a:spcPts val="500"/>
+              </a:spcBef>
+              <a:buFont typeface="Arial" panose="020B0604020202020204" pitchFamily="34" charset="0"/>
+              <a:buNone/>
+              <a:defRPr sz="1800" kern="1200">
+                <a:solidFill>
+                  <a:schemeClr val="tx1"/>
+                </a:solidFill>
+                <a:latin typeface="+mn-lt"/>
+                <a:ea typeface="+mn-ea"/>
+                <a:cs typeface="+mn-cs"/>
+              </a:defRPr>
+            </a:lvl3pPr>
+            <a:lvl4pPr marL="1371600" indent="0" algn="ctr" defTabSz="914400" rtl="0" eaLnBrk="1" latinLnBrk="0" hangingPunct="1">
+              <a:lnSpc>
+                <a:spcPct val="90000"/>
+              </a:lnSpc>
+              <a:spcBef>
+                <a:spcPts val="500"/>
+              </a:spcBef>
+              <a:buFont typeface="Arial" panose="020B0604020202020204" pitchFamily="34" charset="0"/>
+              <a:buNone/>
+              <a:defRPr sz="1600" kern="1200">
+                <a:solidFill>
+                  <a:schemeClr val="tx1"/>
+                </a:solidFill>
+                <a:latin typeface="+mn-lt"/>
+                <a:ea typeface="+mn-ea"/>
+                <a:cs typeface="+mn-cs"/>
+              </a:defRPr>
+            </a:lvl4pPr>
+            <a:lvl5pPr marL="1828800" indent="0" algn="ctr" defTabSz="914400" rtl="0" eaLnBrk="1" latinLnBrk="0" hangingPunct="1">
+              <a:lnSpc>
+                <a:spcPct val="90000"/>
+              </a:lnSpc>
+              <a:spcBef>
+                <a:spcPts val="500"/>
+              </a:spcBef>
+              <a:buFont typeface="Arial" panose="020B0604020202020204" pitchFamily="34" charset="0"/>
+              <a:buNone/>
+              <a:defRPr sz="1600" kern="1200">
+                <a:solidFill>
+                  <a:schemeClr val="tx1"/>
+                </a:solidFill>
+                <a:latin typeface="+mn-lt"/>
+                <a:ea typeface="+mn-ea"/>
+                <a:cs typeface="+mn-cs"/>
+              </a:defRPr>
+            </a:lvl5pPr>
+            <a:lvl6pPr marL="2286000" indent="0" algn="ctr" defTabSz="914400" rtl="0" eaLnBrk="1" latinLnBrk="0" hangingPunct="1">
+              <a:lnSpc>
+                <a:spcPct val="90000"/>
+              </a:lnSpc>
+              <a:spcBef>
+                <a:spcPts val="500"/>
+              </a:spcBef>
+              <a:buFont typeface="Arial" panose="020B0604020202020204" pitchFamily="34" charset="0"/>
+              <a:buNone/>
+              <a:defRPr sz="1600" kern="1200">
+                <a:solidFill>
+                  <a:schemeClr val="tx1"/>
+                </a:solidFill>
+                <a:latin typeface="+mn-lt"/>
+                <a:ea typeface="+mn-ea"/>
+                <a:cs typeface="+mn-cs"/>
+              </a:defRPr>
+            </a:lvl6pPr>
+            <a:lvl7pPr marL="2743200" indent="0" algn="ctr" defTabSz="914400" rtl="0" eaLnBrk="1" latinLnBrk="0" hangingPunct="1">
+              <a:lnSpc>
+                <a:spcPct val="90000"/>
+              </a:lnSpc>
+              <a:spcBef>
+                <a:spcPts val="500"/>
+              </a:spcBef>
+              <a:buFont typeface="Arial" panose="020B0604020202020204" pitchFamily="34" charset="0"/>
+              <a:buNone/>
+              <a:defRPr sz="1600" kern="1200">
+                <a:solidFill>
+                  <a:schemeClr val="tx1"/>
+                </a:solidFill>
+                <a:latin typeface="+mn-lt"/>
+                <a:ea typeface="+mn-ea"/>
+                <a:cs typeface="+mn-cs"/>
+              </a:defRPr>
+            </a:lvl7pPr>
+            <a:lvl8pPr marL="3200400" indent="0" algn="ctr" defTabSz="914400" rtl="0" eaLnBrk="1" latinLnBrk="0" hangingPunct="1">
+              <a:lnSpc>
+                <a:spcPct val="90000"/>
+              </a:lnSpc>
+              <a:spcBef>
+                <a:spcPts val="500"/>
+              </a:spcBef>
+              <a:buFont typeface="Arial" panose="020B0604020202020204" pitchFamily="34" charset="0"/>
+              <a:buNone/>
+              <a:defRPr sz="1600" kern="1200">
+                <a:solidFill>
+                  <a:schemeClr val="tx1"/>
+                </a:solidFill>
+                <a:latin typeface="+mn-lt"/>
+                <a:ea typeface="+mn-ea"/>
+                <a:cs typeface="+mn-cs"/>
+              </a:defRPr>
+            </a:lvl8pPr>
+            <a:lvl9pPr marL="3657600" indent="0" algn="ctr" defTabSz="914400" rtl="0" eaLnBrk="1" latinLnBrk="0" hangingPunct="1">
+              <a:lnSpc>
+                <a:spcPct val="90000"/>
+              </a:lnSpc>
+              <a:spcBef>
+                <a:spcPts val="500"/>
+              </a:spcBef>
+              <a:buFont typeface="Arial" panose="020B0604020202020204" pitchFamily="34" charset="0"/>
+              <a:buNone/>
+              <a:defRPr sz="1600" kern="1200">
+                <a:solidFill>
+                  <a:schemeClr val="tx1"/>
+                </a:solidFill>
+                <a:latin typeface="+mn-lt"/>
+                <a:ea typeface="+mn-ea"/>
+                <a:cs typeface="+mn-cs"/>
+              </a:defRPr>
+            </a:lvl9pPr>
+          </a:lstStyle>
+          <a:p>
+            <a:pPr marL="342900" indent="-342900" algn="l">
+              <a:buFont typeface="Arial" panose="020B0604020202020204" pitchFamily="34" charset="0"/>
+              <a:buChar char="•"/>
+            </a:pPr>
+            <a:endParaRPr lang="en-CH" dirty="0"/>
+          </a:p>
+        </p:txBody>
+      </p:sp>
     </p:spTree>
     <p:extLst>
       <p:ext uri="{BB962C8B-B14F-4D97-AF65-F5344CB8AC3E}">
-        <p14:creationId xmlns:p14="http://schemas.microsoft.com/office/powerpoint/2010/main" val="2471354868"/>
+        <p14:creationId xmlns:p14="http://schemas.microsoft.com/office/powerpoint/2010/main" val="96191238"/>
       </p:ext>
     </p:extLst>
   </p:cSld>
@@ -6388,8 +7846,36 @@
           </a:lstStyle>
           <a:p>
             <a:r>
+              <a:rPr lang="de-CH" sz="4800" dirty="0" err="1"/>
+              <a:t>Did</a:t>
+            </a:r>
+            <a:r>
               <a:rPr lang="de-CH" sz="4800" dirty="0"/>
-              <a:t>Fazit - Prioritäten</a:t>
+              <a:t> </a:t>
+            </a:r>
+            <a:r>
+              <a:rPr lang="de-CH" sz="4800" dirty="0" err="1"/>
+              <a:t>you</a:t>
+            </a:r>
+            <a:r>
+              <a:rPr lang="de-CH" sz="4800" dirty="0"/>
+              <a:t> </a:t>
+            </a:r>
+            <a:r>
+              <a:rPr lang="de-CH" sz="4800" dirty="0" err="1"/>
+              <a:t>have</a:t>
+            </a:r>
+            <a:r>
+              <a:rPr lang="de-CH" sz="4800" dirty="0"/>
+              <a:t> </a:t>
+            </a:r>
+            <a:r>
+              <a:rPr lang="de-CH" sz="4800" dirty="0" err="1"/>
+              <a:t>fun</a:t>
+            </a:r>
+            <a:r>
+              <a:rPr lang="de-CH" sz="4800" dirty="0"/>
+              <a:t>? Vorschläge/Kritik</a:t>
             </a:r>
             <a:endParaRPr lang="en-CH" sz="4800" dirty="0"/>
           </a:p>
@@ -6799,10 +8285,285 @@
           </a:p>
         </p:txBody>
       </p:sp>
+      <p:sp>
+        <p:nvSpPr>
+          <p:cNvPr id="8" name="Subtitle 2">
+            <a:extLst>
+              <a:ext uri="{FF2B5EF4-FFF2-40B4-BE49-F238E27FC236}">
+                <a16:creationId xmlns:a16="http://schemas.microsoft.com/office/drawing/2014/main" id="{1831DB9A-371F-42E5-A5A0-5EA291AD09F6}"/>
+              </a:ext>
+            </a:extLst>
+          </p:cNvPr>
+          <p:cNvSpPr txBox="1">
+            <a:spLocks/>
+          </p:cNvSpPr>
+          <p:nvPr/>
+        </p:nvSpPr>
+        <p:spPr>
+          <a:xfrm>
+            <a:off x="1434546" y="1971118"/>
+            <a:ext cx="8802274" cy="3571037"/>
+          </a:xfrm>
+          <a:prstGeom prst="rect">
+            <a:avLst/>
+          </a:prstGeom>
+        </p:spPr>
+        <p:txBody>
+          <a:bodyPr vert="horz" lIns="91440" tIns="45720" rIns="91440" bIns="45720" rtlCol="0">
+            <a:normAutofit/>
+          </a:bodyPr>
+          <a:lstStyle>
+            <a:lvl1pPr marL="0" indent="0" algn="ctr" defTabSz="914400" rtl="0" eaLnBrk="1" latinLnBrk="0" hangingPunct="1">
+              <a:lnSpc>
+                <a:spcPct val="90000"/>
+              </a:lnSpc>
+              <a:spcBef>
+                <a:spcPts val="1000"/>
+              </a:spcBef>
+              <a:buFont typeface="Arial" panose="020B0604020202020204" pitchFamily="34" charset="0"/>
+              <a:buNone/>
+              <a:defRPr sz="2400" kern="1200">
+                <a:solidFill>
+                  <a:schemeClr val="tx1"/>
+                </a:solidFill>
+                <a:latin typeface="+mn-lt"/>
+                <a:ea typeface="+mn-ea"/>
+                <a:cs typeface="+mn-cs"/>
+              </a:defRPr>
+            </a:lvl1pPr>
+            <a:lvl2pPr marL="457200" indent="0" algn="ctr" defTabSz="914400" rtl="0" eaLnBrk="1" latinLnBrk="0" hangingPunct="1">
+              <a:lnSpc>
+                <a:spcPct val="90000"/>
+              </a:lnSpc>
+              <a:spcBef>
+                <a:spcPts val="500"/>
+              </a:spcBef>
+              <a:buFont typeface="Arial" panose="020B0604020202020204" pitchFamily="34" charset="0"/>
+              <a:buNone/>
+              <a:defRPr sz="2000" kern="1200">
+                <a:solidFill>
+                  <a:schemeClr val="tx1"/>
+                </a:solidFill>
+                <a:latin typeface="+mn-lt"/>
+                <a:ea typeface="+mn-ea"/>
+                <a:cs typeface="+mn-cs"/>
+              </a:defRPr>
+            </a:lvl2pPr>
+            <a:lvl3pPr marL="914400" indent="0" algn="ctr" defTabSz="914400" rtl="0" eaLnBrk="1" latinLnBrk="0" hangingPunct="1">
+              <a:lnSpc>
+                <a:spcPct val="90000"/>
+              </a:lnSpc>
+              <a:spcBef>
+                <a:spcPts val="500"/>
+              </a:spcBef>
+              <a:buFont typeface="Arial" panose="020B0604020202020204" pitchFamily="34" charset="0"/>
+              <a:buNone/>
+              <a:defRPr sz="1800" kern="1200">
+                <a:solidFill>
+                  <a:schemeClr val="tx1"/>
+                </a:solidFill>
+                <a:latin typeface="+mn-lt"/>
+                <a:ea typeface="+mn-ea"/>
+                <a:cs typeface="+mn-cs"/>
+              </a:defRPr>
+            </a:lvl3pPr>
+            <a:lvl4pPr marL="1371600" indent="0" algn="ctr" defTabSz="914400" rtl="0" eaLnBrk="1" latinLnBrk="0" hangingPunct="1">
+              <a:lnSpc>
+                <a:spcPct val="90000"/>
+              </a:lnSpc>
+              <a:spcBef>
+                <a:spcPts val="500"/>
+              </a:spcBef>
+              <a:buFont typeface="Arial" panose="020B0604020202020204" pitchFamily="34" charset="0"/>
+              <a:buNone/>
+              <a:defRPr sz="1600" kern="1200">
+                <a:solidFill>
+                  <a:schemeClr val="tx1"/>
+                </a:solidFill>
+                <a:latin typeface="+mn-lt"/>
+                <a:ea typeface="+mn-ea"/>
+                <a:cs typeface="+mn-cs"/>
+              </a:defRPr>
+            </a:lvl4pPr>
+            <a:lvl5pPr marL="1828800" indent="0" algn="ctr" defTabSz="914400" rtl="0" eaLnBrk="1" latinLnBrk="0" hangingPunct="1">
+              <a:lnSpc>
+                <a:spcPct val="90000"/>
+              </a:lnSpc>
+              <a:spcBef>
+                <a:spcPts val="500"/>
+              </a:spcBef>
+              <a:buFont typeface="Arial" panose="020B0604020202020204" pitchFamily="34" charset="0"/>
+              <a:buNone/>
+              <a:defRPr sz="1600" kern="1200">
+                <a:solidFill>
+                  <a:schemeClr val="tx1"/>
+                </a:solidFill>
+                <a:latin typeface="+mn-lt"/>
+                <a:ea typeface="+mn-ea"/>
+                <a:cs typeface="+mn-cs"/>
+              </a:defRPr>
+            </a:lvl5pPr>
+            <a:lvl6pPr marL="2286000" indent="0" algn="ctr" defTabSz="914400" rtl="0" eaLnBrk="1" latinLnBrk="0" hangingPunct="1">
+              <a:lnSpc>
+                <a:spcPct val="90000"/>
+              </a:lnSpc>
+              <a:spcBef>
+                <a:spcPts val="500"/>
+              </a:spcBef>
+              <a:buFont typeface="Arial" panose="020B0604020202020204" pitchFamily="34" charset="0"/>
+              <a:buNone/>
+              <a:defRPr sz="1600" kern="1200">
+                <a:solidFill>
+                  <a:schemeClr val="tx1"/>
+                </a:solidFill>
+                <a:latin typeface="+mn-lt"/>
+                <a:ea typeface="+mn-ea"/>
+                <a:cs typeface="+mn-cs"/>
+              </a:defRPr>
+            </a:lvl6pPr>
+            <a:lvl7pPr marL="2743200" indent="0" algn="ctr" defTabSz="914400" rtl="0" eaLnBrk="1" latinLnBrk="0" hangingPunct="1">
+              <a:lnSpc>
+                <a:spcPct val="90000"/>
+              </a:lnSpc>
+              <a:spcBef>
+                <a:spcPts val="500"/>
+              </a:spcBef>
+              <a:buFont typeface="Arial" panose="020B0604020202020204" pitchFamily="34" charset="0"/>
+              <a:buNone/>
+              <a:defRPr sz="1600" kern="1200">
+                <a:solidFill>
+                  <a:schemeClr val="tx1"/>
+                </a:solidFill>
+                <a:latin typeface="+mn-lt"/>
+                <a:ea typeface="+mn-ea"/>
+                <a:cs typeface="+mn-cs"/>
+              </a:defRPr>
+            </a:lvl7pPr>
+            <a:lvl8pPr marL="3200400" indent="0" algn="ctr" defTabSz="914400" rtl="0" eaLnBrk="1" latinLnBrk="0" hangingPunct="1">
+              <a:lnSpc>
+                <a:spcPct val="90000"/>
+              </a:lnSpc>
+              <a:spcBef>
+                <a:spcPts val="500"/>
+              </a:spcBef>
+              <a:buFont typeface="Arial" panose="020B0604020202020204" pitchFamily="34" charset="0"/>
+              <a:buNone/>
+              <a:defRPr sz="1600" kern="1200">
+                <a:solidFill>
+                  <a:schemeClr val="tx1"/>
+                </a:solidFill>
+                <a:latin typeface="+mn-lt"/>
+                <a:ea typeface="+mn-ea"/>
+                <a:cs typeface="+mn-cs"/>
+              </a:defRPr>
+            </a:lvl8pPr>
+            <a:lvl9pPr marL="3657600" indent="0" algn="ctr" defTabSz="914400" rtl="0" eaLnBrk="1" latinLnBrk="0" hangingPunct="1">
+              <a:lnSpc>
+                <a:spcPct val="90000"/>
+              </a:lnSpc>
+              <a:spcBef>
+                <a:spcPts val="500"/>
+              </a:spcBef>
+              <a:buFont typeface="Arial" panose="020B0604020202020204" pitchFamily="34" charset="0"/>
+              <a:buNone/>
+              <a:defRPr sz="1600" kern="1200">
+                <a:solidFill>
+                  <a:schemeClr val="tx1"/>
+                </a:solidFill>
+                <a:latin typeface="+mn-lt"/>
+                <a:ea typeface="+mn-ea"/>
+                <a:cs typeface="+mn-cs"/>
+              </a:defRPr>
+            </a:lvl9pPr>
+          </a:lstStyle>
+          <a:p>
+            <a:pPr marL="342900" indent="-342900" algn="l">
+              <a:buFont typeface="Arial" panose="020B0604020202020204" pitchFamily="34" charset="0"/>
+              <a:buChar char="•"/>
+            </a:pPr>
+            <a:r>
+              <a:rPr lang="de-CH" dirty="0"/>
+              <a:t>Fliegende Bienenschwärme </a:t>
+            </a:r>
+          </a:p>
+          <a:p>
+            <a:pPr marL="800100" lvl="1" indent="-342900" algn="l">
+              <a:buFont typeface="Arial" panose="020B0604020202020204" pitchFamily="34" charset="0"/>
+              <a:buChar char="•"/>
+            </a:pPr>
+            <a:r>
+              <a:rPr lang="de-CH" dirty="0"/>
+              <a:t>Bienenähnliche Partikel</a:t>
+            </a:r>
+          </a:p>
+          <a:p>
+            <a:pPr marL="342900" indent="-342900" algn="l">
+              <a:buFont typeface="Arial" panose="020B0604020202020204" pitchFamily="34" charset="0"/>
+              <a:buChar char="•"/>
+            </a:pPr>
+            <a:r>
+              <a:rPr lang="de-CH" dirty="0"/>
+              <a:t>Ich fand mich nicht zurecht</a:t>
+            </a:r>
+          </a:p>
+          <a:p>
+            <a:pPr marL="800100" lvl="1" indent="-342900" algn="l">
+              <a:buFont typeface="Arial" panose="020B0604020202020204" pitchFamily="34" charset="0"/>
+              <a:buChar char="•"/>
+            </a:pPr>
+            <a:r>
+              <a:rPr lang="de-CH" dirty="0"/>
+              <a:t>Tutorial grundlegende Spielelemente</a:t>
+            </a:r>
+          </a:p>
+          <a:p>
+            <a:pPr marL="342900" indent="-342900" algn="l">
+              <a:buFont typeface="Arial" panose="020B0604020202020204" pitchFamily="34" charset="0"/>
+              <a:buChar char="•"/>
+            </a:pPr>
+            <a:r>
+              <a:rPr lang="de-CH" dirty="0"/>
+              <a:t>Mehr Spiel / Mehr Inhalt</a:t>
+            </a:r>
+          </a:p>
+          <a:p>
+            <a:pPr marL="800100" lvl="1" indent="-342900" algn="l">
+              <a:buFont typeface="Arial" panose="020B0604020202020204" pitchFamily="34" charset="0"/>
+              <a:buChar char="•"/>
+            </a:pPr>
+            <a:r>
+              <a:rPr lang="de-CH" dirty="0"/>
+              <a:t>Ziel der nächsten </a:t>
+            </a:r>
+            <a:r>
+              <a:rPr lang="de-CH" dirty="0" err="1"/>
+              <a:t>Interation</a:t>
+            </a:r>
+            <a:r>
+              <a:rPr lang="de-CH" dirty="0"/>
+              <a:t>, das Spiel mit mehr Inhalt zu füllen</a:t>
+            </a:r>
+          </a:p>
+          <a:p>
+            <a:pPr marL="800100" lvl="1" indent="-342900" algn="l">
+              <a:buFont typeface="Arial" panose="020B0604020202020204" pitchFamily="34" charset="0"/>
+              <a:buChar char="•"/>
+            </a:pPr>
+            <a:endParaRPr lang="de-CH" dirty="0"/>
+          </a:p>
+          <a:p>
+            <a:pPr marL="342900" indent="-342900" algn="l">
+              <a:buFont typeface="Arial" panose="020B0604020202020204" pitchFamily="34" charset="0"/>
+              <a:buChar char="•"/>
+            </a:pPr>
+            <a:endParaRPr lang="en-CH" dirty="0"/>
+          </a:p>
+        </p:txBody>
+      </p:sp>
     </p:spTree>
     <p:extLst>
       <p:ext uri="{BB962C8B-B14F-4D97-AF65-F5344CB8AC3E}">
-        <p14:creationId xmlns:p14="http://schemas.microsoft.com/office/powerpoint/2010/main" val="721238863"/>
+        <p14:creationId xmlns:p14="http://schemas.microsoft.com/office/powerpoint/2010/main" val="3284023661"/>
       </p:ext>
     </p:extLst>
   </p:cSld>
@@ -6877,8 +8638,12 @@
           </a:lstStyle>
           <a:p>
             <a:r>
+              <a:rPr lang="de-CH" sz="4800" dirty="0" err="1"/>
+              <a:t>Intuitivität</a:t>
+            </a:r>
+            <a:r>
               <a:rPr lang="de-CH" sz="4800" dirty="0"/>
-              <a:t>Vorher - Nachher</a:t>
+              <a:t> der Buttons</a:t>
             </a:r>
             <a:endParaRPr lang="en-CH" sz="4800" dirty="0"/>
           </a:p>
@@ -7080,65 +8845,6 @@
               <a:buFont typeface="Arial" panose="020B0604020202020204" pitchFamily="34" charset="0"/>
               <a:buChar char="•"/>
             </a:pPr>
-            <a:r>
-              <a:rPr lang="de-CH" dirty="0" err="1"/>
-              <a:t>Z.b.</a:t>
-            </a:r>
-            <a:r>
-              <a:rPr lang="de-CH" dirty="0"/>
-              <a:t> </a:t>
-            </a:r>
-            <a:r>
-              <a:rPr lang="de-CH" dirty="0" err="1"/>
-              <a:t>Tileplace</a:t>
-            </a:r>
-            <a:r>
-              <a:rPr lang="de-CH" dirty="0"/>
-              <a:t> für </a:t>
-            </a:r>
-            <a:r>
-              <a:rPr lang="de-CH" dirty="0" err="1"/>
-              <a:t>abbruch</a:t>
-            </a:r>
-            <a:r>
-              <a:rPr lang="de-CH" dirty="0"/>
-              <a:t> </a:t>
-            </a:r>
-            <a:r>
-              <a:rPr lang="de-CH" dirty="0" err="1"/>
-              <a:t>drag</a:t>
-            </a:r>
-            <a:r>
-              <a:rPr lang="de-CH" dirty="0"/>
-              <a:t>/</a:t>
-            </a:r>
-            <a:r>
-              <a:rPr lang="de-CH" dirty="0" err="1"/>
-              <a:t>drop</a:t>
-            </a:r>
-            <a:endParaRPr lang="de-CH" dirty="0"/>
-          </a:p>
-          <a:p>
-            <a:pPr marL="342900" indent="-342900" algn="l">
-              <a:buFont typeface="Arial" panose="020B0604020202020204" pitchFamily="34" charset="0"/>
-              <a:buChar char="•"/>
-            </a:pPr>
-            <a:r>
-              <a:rPr lang="de-CH" dirty="0"/>
-              <a:t>Verkürzung </a:t>
-            </a:r>
-            <a:r>
-              <a:rPr lang="de-CH" dirty="0" err="1"/>
-              <a:t>Animationszeits</a:t>
-            </a:r>
-            <a:r>
-              <a:rPr lang="de-CH" dirty="0"/>
-              <a:t> zwischen </a:t>
-            </a:r>
-            <a:r>
-              <a:rPr lang="de-CH" dirty="0" err="1"/>
-              <a:t>Scenen</a:t>
-            </a:r>
             <a:endParaRPr lang="en-CH" dirty="0"/>
           </a:p>
         </p:txBody>
@@ -7347,10 +9053,210 @@
           </a:p>
         </p:txBody>
       </p:sp>
+      <p:sp>
+        <p:nvSpPr>
+          <p:cNvPr id="8" name="Subtitle 2">
+            <a:extLst>
+              <a:ext uri="{FF2B5EF4-FFF2-40B4-BE49-F238E27FC236}">
+                <a16:creationId xmlns:a16="http://schemas.microsoft.com/office/drawing/2014/main" id="{1831DB9A-371F-42E5-A5A0-5EA291AD09F6}"/>
+              </a:ext>
+            </a:extLst>
+          </p:cNvPr>
+          <p:cNvSpPr txBox="1">
+            <a:spLocks/>
+          </p:cNvSpPr>
+          <p:nvPr/>
+        </p:nvSpPr>
+        <p:spPr>
+          <a:xfrm>
+            <a:off x="1434546" y="1971118"/>
+            <a:ext cx="8802274" cy="3571037"/>
+          </a:xfrm>
+          <a:prstGeom prst="rect">
+            <a:avLst/>
+          </a:prstGeom>
+        </p:spPr>
+        <p:txBody>
+          <a:bodyPr vert="horz" lIns="91440" tIns="45720" rIns="91440" bIns="45720" rtlCol="0">
+            <a:normAutofit/>
+          </a:bodyPr>
+          <a:lstStyle>
+            <a:lvl1pPr marL="0" indent="0" algn="ctr" defTabSz="914400" rtl="0" eaLnBrk="1" latinLnBrk="0" hangingPunct="1">
+              <a:lnSpc>
+                <a:spcPct val="90000"/>
+              </a:lnSpc>
+              <a:spcBef>
+                <a:spcPts val="1000"/>
+              </a:spcBef>
+              <a:buFont typeface="Arial" panose="020B0604020202020204" pitchFamily="34" charset="0"/>
+              <a:buNone/>
+              <a:defRPr sz="2400" kern="1200">
+                <a:solidFill>
+                  <a:schemeClr val="tx1"/>
+                </a:solidFill>
+                <a:latin typeface="+mn-lt"/>
+                <a:ea typeface="+mn-ea"/>
+                <a:cs typeface="+mn-cs"/>
+              </a:defRPr>
+            </a:lvl1pPr>
+            <a:lvl2pPr marL="457200" indent="0" algn="ctr" defTabSz="914400" rtl="0" eaLnBrk="1" latinLnBrk="0" hangingPunct="1">
+              <a:lnSpc>
+                <a:spcPct val="90000"/>
+              </a:lnSpc>
+              <a:spcBef>
+                <a:spcPts val="500"/>
+              </a:spcBef>
+              <a:buFont typeface="Arial" panose="020B0604020202020204" pitchFamily="34" charset="0"/>
+              <a:buNone/>
+              <a:defRPr sz="2000" kern="1200">
+                <a:solidFill>
+                  <a:schemeClr val="tx1"/>
+                </a:solidFill>
+                <a:latin typeface="+mn-lt"/>
+                <a:ea typeface="+mn-ea"/>
+                <a:cs typeface="+mn-cs"/>
+              </a:defRPr>
+            </a:lvl2pPr>
+            <a:lvl3pPr marL="914400" indent="0" algn="ctr" defTabSz="914400" rtl="0" eaLnBrk="1" latinLnBrk="0" hangingPunct="1">
+              <a:lnSpc>
+                <a:spcPct val="90000"/>
+              </a:lnSpc>
+              <a:spcBef>
+                <a:spcPts val="500"/>
+              </a:spcBef>
+              <a:buFont typeface="Arial" panose="020B0604020202020204" pitchFamily="34" charset="0"/>
+              <a:buNone/>
+              <a:defRPr sz="1800" kern="1200">
+                <a:solidFill>
+                  <a:schemeClr val="tx1"/>
+                </a:solidFill>
+                <a:latin typeface="+mn-lt"/>
+                <a:ea typeface="+mn-ea"/>
+                <a:cs typeface="+mn-cs"/>
+              </a:defRPr>
+            </a:lvl3pPr>
+            <a:lvl4pPr marL="1371600" indent="0" algn="ctr" defTabSz="914400" rtl="0" eaLnBrk="1" latinLnBrk="0" hangingPunct="1">
+              <a:lnSpc>
+                <a:spcPct val="90000"/>
+              </a:lnSpc>
+              <a:spcBef>
+                <a:spcPts val="500"/>
+              </a:spcBef>
+              <a:buFont typeface="Arial" panose="020B0604020202020204" pitchFamily="34" charset="0"/>
+              <a:buNone/>
+              <a:defRPr sz="1600" kern="1200">
+                <a:solidFill>
+                  <a:schemeClr val="tx1"/>
+                </a:solidFill>
+                <a:latin typeface="+mn-lt"/>
+                <a:ea typeface="+mn-ea"/>
+                <a:cs typeface="+mn-cs"/>
+              </a:defRPr>
+            </a:lvl4pPr>
+            <a:lvl5pPr marL="1828800" indent="0" algn="ctr" defTabSz="914400" rtl="0" eaLnBrk="1" latinLnBrk="0" hangingPunct="1">
+              <a:lnSpc>
+                <a:spcPct val="90000"/>
+              </a:lnSpc>
+              <a:spcBef>
+                <a:spcPts val="500"/>
+              </a:spcBef>
+              <a:buFont typeface="Arial" panose="020B0604020202020204" pitchFamily="34" charset="0"/>
+              <a:buNone/>
+              <a:defRPr sz="1600" kern="1200">
+                <a:solidFill>
+                  <a:schemeClr val="tx1"/>
+                </a:solidFill>
+                <a:latin typeface="+mn-lt"/>
+                <a:ea typeface="+mn-ea"/>
+                <a:cs typeface="+mn-cs"/>
+              </a:defRPr>
+            </a:lvl5pPr>
+            <a:lvl6pPr marL="2286000" indent="0" algn="ctr" defTabSz="914400" rtl="0" eaLnBrk="1" latinLnBrk="0" hangingPunct="1">
+              <a:lnSpc>
+                <a:spcPct val="90000"/>
+              </a:lnSpc>
+              <a:spcBef>
+                <a:spcPts val="500"/>
+              </a:spcBef>
+              <a:buFont typeface="Arial" panose="020B0604020202020204" pitchFamily="34" charset="0"/>
+              <a:buNone/>
+              <a:defRPr sz="1600" kern="1200">
+                <a:solidFill>
+                  <a:schemeClr val="tx1"/>
+                </a:solidFill>
+                <a:latin typeface="+mn-lt"/>
+                <a:ea typeface="+mn-ea"/>
+                <a:cs typeface="+mn-cs"/>
+              </a:defRPr>
+            </a:lvl6pPr>
+            <a:lvl7pPr marL="2743200" indent="0" algn="ctr" defTabSz="914400" rtl="0" eaLnBrk="1" latinLnBrk="0" hangingPunct="1">
+              <a:lnSpc>
+                <a:spcPct val="90000"/>
+              </a:lnSpc>
+              <a:spcBef>
+                <a:spcPts val="500"/>
+              </a:spcBef>
+              <a:buFont typeface="Arial" panose="020B0604020202020204" pitchFamily="34" charset="0"/>
+              <a:buNone/>
+              <a:defRPr sz="1600" kern="1200">
+                <a:solidFill>
+                  <a:schemeClr val="tx1"/>
+                </a:solidFill>
+                <a:latin typeface="+mn-lt"/>
+                <a:ea typeface="+mn-ea"/>
+                <a:cs typeface="+mn-cs"/>
+              </a:defRPr>
+            </a:lvl7pPr>
+            <a:lvl8pPr marL="3200400" indent="0" algn="ctr" defTabSz="914400" rtl="0" eaLnBrk="1" latinLnBrk="0" hangingPunct="1">
+              <a:lnSpc>
+                <a:spcPct val="90000"/>
+              </a:lnSpc>
+              <a:spcBef>
+                <a:spcPts val="500"/>
+              </a:spcBef>
+              <a:buFont typeface="Arial" panose="020B0604020202020204" pitchFamily="34" charset="0"/>
+              <a:buNone/>
+              <a:defRPr sz="1600" kern="1200">
+                <a:solidFill>
+                  <a:schemeClr val="tx1"/>
+                </a:solidFill>
+                <a:latin typeface="+mn-lt"/>
+                <a:ea typeface="+mn-ea"/>
+                <a:cs typeface="+mn-cs"/>
+              </a:defRPr>
+            </a:lvl8pPr>
+            <a:lvl9pPr marL="3657600" indent="0" algn="ctr" defTabSz="914400" rtl="0" eaLnBrk="1" latinLnBrk="0" hangingPunct="1">
+              <a:lnSpc>
+                <a:spcPct val="90000"/>
+              </a:lnSpc>
+              <a:spcBef>
+                <a:spcPts val="500"/>
+              </a:spcBef>
+              <a:buFont typeface="Arial" panose="020B0604020202020204" pitchFamily="34" charset="0"/>
+              <a:buNone/>
+              <a:defRPr sz="1600" kern="1200">
+                <a:solidFill>
+                  <a:schemeClr val="tx1"/>
+                </a:solidFill>
+                <a:latin typeface="+mn-lt"/>
+                <a:ea typeface="+mn-ea"/>
+                <a:cs typeface="+mn-cs"/>
+              </a:defRPr>
+            </a:lvl9pPr>
+          </a:lstStyle>
+          <a:p>
+            <a:pPr marL="342900" indent="-342900" algn="l">
+              <a:buFont typeface="Arial" panose="020B0604020202020204" pitchFamily="34" charset="0"/>
+              <a:buChar char="•"/>
+            </a:pPr>
+            <a:endParaRPr lang="en-CH" dirty="0"/>
+          </a:p>
+        </p:txBody>
+      </p:sp>
     </p:spTree>
     <p:extLst>
       <p:ext uri="{BB962C8B-B14F-4D97-AF65-F5344CB8AC3E}">
-        <p14:creationId xmlns:p14="http://schemas.microsoft.com/office/powerpoint/2010/main" val="1232605771"/>
+        <p14:creationId xmlns:p14="http://schemas.microsoft.com/office/powerpoint/2010/main" val="524771381"/>
       </p:ext>
     </p:extLst>
   </p:cSld>
@@ -7379,35 +9285,58 @@
       </p:grpSpPr>
       <p:sp>
         <p:nvSpPr>
-          <p:cNvPr id="2" name="Title 1">
-            <a:extLst>
-              <a:ext uri="{FF2B5EF4-FFF2-40B4-BE49-F238E27FC236}">
-                <a16:creationId xmlns:a16="http://schemas.microsoft.com/office/drawing/2014/main" id="{0E405776-8BA9-4C4E-8757-D28431CCF3E0}"/>
-              </a:ext>
-            </a:extLst>
-          </p:cNvPr>
-          <p:cNvSpPr>
-            <a:spLocks noGrp="1"/>
-          </p:cNvSpPr>
-          <p:nvPr>
-            <p:ph type="ctrTitle"/>
-          </p:nvPr>
+          <p:cNvPr id="20" name="Title 1">
+            <a:extLst>
+              <a:ext uri="{FF2B5EF4-FFF2-40B4-BE49-F238E27FC236}">
+                <a16:creationId xmlns:a16="http://schemas.microsoft.com/office/drawing/2014/main" id="{BA7DEFD2-952A-47AA-AB94-829BDDBDD9E4}"/>
+              </a:ext>
+            </a:extLst>
+          </p:cNvPr>
+          <p:cNvSpPr txBox="1">
+            <a:spLocks/>
+          </p:cNvSpPr>
+          <p:nvPr/>
         </p:nvSpPr>
         <p:spPr>
           <a:xfrm>
             <a:off x="1282147" y="474591"/>
             <a:ext cx="9144000" cy="886033"/>
           </a:xfrm>
+          <a:prstGeom prst="rect">
+            <a:avLst/>
+          </a:prstGeom>
         </p:spPr>
         <p:txBody>
-          <a:bodyPr>
+          <a:bodyPr vert="horz" lIns="91440" tIns="45720" rIns="91440" bIns="45720" rtlCol="0" anchor="b">
             <a:normAutofit/>
           </a:bodyPr>
-          <a:lstStyle/>
-          <a:p>
+          <a:lstStyle>
+            <a:lvl1pPr algn="ctr" defTabSz="914400" rtl="0" eaLnBrk="1" latinLnBrk="0" hangingPunct="1">
+              <a:lnSpc>
+                <a:spcPct val="90000"/>
+              </a:lnSpc>
+              <a:spcBef>
+                <a:spcPct val="0"/>
+              </a:spcBef>
+              <a:buNone/>
+              <a:defRPr sz="6000" kern="1200">
+                <a:solidFill>
+                  <a:schemeClr val="tx1"/>
+                </a:solidFill>
+                <a:latin typeface="+mj-lt"/>
+                <a:ea typeface="+mj-ea"/>
+                <a:cs typeface="+mj-cs"/>
+              </a:defRPr>
+            </a:lvl1pPr>
+          </a:lstStyle>
+          <a:p>
+            <a:r>
+              <a:rPr lang="de-CH" sz="4800" dirty="0" err="1"/>
+              <a:t>Intuitivität</a:t>
+            </a:r>
             <a:r>
               <a:rPr lang="de-CH" sz="4800" dirty="0"/>
-              <a:t>Fragen/Diskussion</a:t>
+              <a:t> der Buttons</a:t>
             </a:r>
             <a:endParaRPr lang="en-CH" sz="4800" dirty="0"/>
           </a:p>
@@ -7415,10 +9344,210 @@
       </p:sp>
       <p:sp>
         <p:nvSpPr>
-          <p:cNvPr id="4" name="Slide Number Placeholder 3">
-            <a:extLst>
-              <a:ext uri="{FF2B5EF4-FFF2-40B4-BE49-F238E27FC236}">
-                <a16:creationId xmlns:a16="http://schemas.microsoft.com/office/drawing/2014/main" id="{93203F41-B8AC-41D4-A739-92BF6FA5069E}"/>
+          <p:cNvPr id="21" name="Subtitle 2">
+            <a:extLst>
+              <a:ext uri="{FF2B5EF4-FFF2-40B4-BE49-F238E27FC236}">
+                <a16:creationId xmlns:a16="http://schemas.microsoft.com/office/drawing/2014/main" id="{8333B1ED-AB10-4243-A67B-CC404ABFDF61}"/>
+              </a:ext>
+            </a:extLst>
+          </p:cNvPr>
+          <p:cNvSpPr txBox="1">
+            <a:spLocks/>
+          </p:cNvSpPr>
+          <p:nvPr/>
+        </p:nvSpPr>
+        <p:spPr>
+          <a:xfrm>
+            <a:off x="1282146" y="1818719"/>
+            <a:ext cx="9751614" cy="2922246"/>
+          </a:xfrm>
+          <a:prstGeom prst="rect">
+            <a:avLst/>
+          </a:prstGeom>
+        </p:spPr>
+        <p:txBody>
+          <a:bodyPr vert="horz" lIns="91440" tIns="45720" rIns="91440" bIns="45720" rtlCol="0">
+            <a:normAutofit/>
+          </a:bodyPr>
+          <a:lstStyle>
+            <a:lvl1pPr marL="0" indent="0" algn="ctr" defTabSz="914400" rtl="0" eaLnBrk="1" latinLnBrk="0" hangingPunct="1">
+              <a:lnSpc>
+                <a:spcPct val="90000"/>
+              </a:lnSpc>
+              <a:spcBef>
+                <a:spcPts val="1000"/>
+              </a:spcBef>
+              <a:buFont typeface="Arial" panose="020B0604020202020204" pitchFamily="34" charset="0"/>
+              <a:buNone/>
+              <a:defRPr sz="2400" kern="1200">
+                <a:solidFill>
+                  <a:schemeClr val="tx1"/>
+                </a:solidFill>
+                <a:latin typeface="+mn-lt"/>
+                <a:ea typeface="+mn-ea"/>
+                <a:cs typeface="+mn-cs"/>
+              </a:defRPr>
+            </a:lvl1pPr>
+            <a:lvl2pPr marL="457200" indent="0" algn="ctr" defTabSz="914400" rtl="0" eaLnBrk="1" latinLnBrk="0" hangingPunct="1">
+              <a:lnSpc>
+                <a:spcPct val="90000"/>
+              </a:lnSpc>
+              <a:spcBef>
+                <a:spcPts val="500"/>
+              </a:spcBef>
+              <a:buFont typeface="Arial" panose="020B0604020202020204" pitchFamily="34" charset="0"/>
+              <a:buNone/>
+              <a:defRPr sz="2000" kern="1200">
+                <a:solidFill>
+                  <a:schemeClr val="tx1"/>
+                </a:solidFill>
+                <a:latin typeface="+mn-lt"/>
+                <a:ea typeface="+mn-ea"/>
+                <a:cs typeface="+mn-cs"/>
+              </a:defRPr>
+            </a:lvl2pPr>
+            <a:lvl3pPr marL="914400" indent="0" algn="ctr" defTabSz="914400" rtl="0" eaLnBrk="1" latinLnBrk="0" hangingPunct="1">
+              <a:lnSpc>
+                <a:spcPct val="90000"/>
+              </a:lnSpc>
+              <a:spcBef>
+                <a:spcPts val="500"/>
+              </a:spcBef>
+              <a:buFont typeface="Arial" panose="020B0604020202020204" pitchFamily="34" charset="0"/>
+              <a:buNone/>
+              <a:defRPr sz="1800" kern="1200">
+                <a:solidFill>
+                  <a:schemeClr val="tx1"/>
+                </a:solidFill>
+                <a:latin typeface="+mn-lt"/>
+                <a:ea typeface="+mn-ea"/>
+                <a:cs typeface="+mn-cs"/>
+              </a:defRPr>
+            </a:lvl3pPr>
+            <a:lvl4pPr marL="1371600" indent="0" algn="ctr" defTabSz="914400" rtl="0" eaLnBrk="1" latinLnBrk="0" hangingPunct="1">
+              <a:lnSpc>
+                <a:spcPct val="90000"/>
+              </a:lnSpc>
+              <a:spcBef>
+                <a:spcPts val="500"/>
+              </a:spcBef>
+              <a:buFont typeface="Arial" panose="020B0604020202020204" pitchFamily="34" charset="0"/>
+              <a:buNone/>
+              <a:defRPr sz="1600" kern="1200">
+                <a:solidFill>
+                  <a:schemeClr val="tx1"/>
+                </a:solidFill>
+                <a:latin typeface="+mn-lt"/>
+                <a:ea typeface="+mn-ea"/>
+                <a:cs typeface="+mn-cs"/>
+              </a:defRPr>
+            </a:lvl4pPr>
+            <a:lvl5pPr marL="1828800" indent="0" algn="ctr" defTabSz="914400" rtl="0" eaLnBrk="1" latinLnBrk="0" hangingPunct="1">
+              <a:lnSpc>
+                <a:spcPct val="90000"/>
+              </a:lnSpc>
+              <a:spcBef>
+                <a:spcPts val="500"/>
+              </a:spcBef>
+              <a:buFont typeface="Arial" panose="020B0604020202020204" pitchFamily="34" charset="0"/>
+              <a:buNone/>
+              <a:defRPr sz="1600" kern="1200">
+                <a:solidFill>
+                  <a:schemeClr val="tx1"/>
+                </a:solidFill>
+                <a:latin typeface="+mn-lt"/>
+                <a:ea typeface="+mn-ea"/>
+                <a:cs typeface="+mn-cs"/>
+              </a:defRPr>
+            </a:lvl5pPr>
+            <a:lvl6pPr marL="2286000" indent="0" algn="ctr" defTabSz="914400" rtl="0" eaLnBrk="1" latinLnBrk="0" hangingPunct="1">
+              <a:lnSpc>
+                <a:spcPct val="90000"/>
+              </a:lnSpc>
+              <a:spcBef>
+                <a:spcPts val="500"/>
+              </a:spcBef>
+              <a:buFont typeface="Arial" panose="020B0604020202020204" pitchFamily="34" charset="0"/>
+              <a:buNone/>
+              <a:defRPr sz="1600" kern="1200">
+                <a:solidFill>
+                  <a:schemeClr val="tx1"/>
+                </a:solidFill>
+                <a:latin typeface="+mn-lt"/>
+                <a:ea typeface="+mn-ea"/>
+                <a:cs typeface="+mn-cs"/>
+              </a:defRPr>
+            </a:lvl6pPr>
+            <a:lvl7pPr marL="2743200" indent="0" algn="ctr" defTabSz="914400" rtl="0" eaLnBrk="1" latinLnBrk="0" hangingPunct="1">
+              <a:lnSpc>
+                <a:spcPct val="90000"/>
+              </a:lnSpc>
+              <a:spcBef>
+                <a:spcPts val="500"/>
+              </a:spcBef>
+              <a:buFont typeface="Arial" panose="020B0604020202020204" pitchFamily="34" charset="0"/>
+              <a:buNone/>
+              <a:defRPr sz="1600" kern="1200">
+                <a:solidFill>
+                  <a:schemeClr val="tx1"/>
+                </a:solidFill>
+                <a:latin typeface="+mn-lt"/>
+                <a:ea typeface="+mn-ea"/>
+                <a:cs typeface="+mn-cs"/>
+              </a:defRPr>
+            </a:lvl7pPr>
+            <a:lvl8pPr marL="3200400" indent="0" algn="ctr" defTabSz="914400" rtl="0" eaLnBrk="1" latinLnBrk="0" hangingPunct="1">
+              <a:lnSpc>
+                <a:spcPct val="90000"/>
+              </a:lnSpc>
+              <a:spcBef>
+                <a:spcPts val="500"/>
+              </a:spcBef>
+              <a:buFont typeface="Arial" panose="020B0604020202020204" pitchFamily="34" charset="0"/>
+              <a:buNone/>
+              <a:defRPr sz="1600" kern="1200">
+                <a:solidFill>
+                  <a:schemeClr val="tx1"/>
+                </a:solidFill>
+                <a:latin typeface="+mn-lt"/>
+                <a:ea typeface="+mn-ea"/>
+                <a:cs typeface="+mn-cs"/>
+              </a:defRPr>
+            </a:lvl8pPr>
+            <a:lvl9pPr marL="3657600" indent="0" algn="ctr" defTabSz="914400" rtl="0" eaLnBrk="1" latinLnBrk="0" hangingPunct="1">
+              <a:lnSpc>
+                <a:spcPct val="90000"/>
+              </a:lnSpc>
+              <a:spcBef>
+                <a:spcPts val="500"/>
+              </a:spcBef>
+              <a:buFont typeface="Arial" panose="020B0604020202020204" pitchFamily="34" charset="0"/>
+              <a:buNone/>
+              <a:defRPr sz="1600" kern="1200">
+                <a:solidFill>
+                  <a:schemeClr val="tx1"/>
+                </a:solidFill>
+                <a:latin typeface="+mn-lt"/>
+                <a:ea typeface="+mn-ea"/>
+                <a:cs typeface="+mn-cs"/>
+              </a:defRPr>
+            </a:lvl9pPr>
+          </a:lstStyle>
+          <a:p>
+            <a:pPr marL="342900" indent="-342900" algn="l">
+              <a:buFont typeface="Arial" panose="020B0604020202020204" pitchFamily="34" charset="0"/>
+              <a:buChar char="•"/>
+            </a:pPr>
+            <a:endParaRPr lang="en-CH" dirty="0"/>
+          </a:p>
+        </p:txBody>
+      </p:sp>
+      <p:sp>
+        <p:nvSpPr>
+          <p:cNvPr id="22" name="Slide Number Placeholder 3">
+            <a:extLst>
+              <a:ext uri="{FF2B5EF4-FFF2-40B4-BE49-F238E27FC236}">
+                <a16:creationId xmlns:a16="http://schemas.microsoft.com/office/drawing/2014/main" id="{30CC832F-1DF6-496C-AEBF-2FE46D26053A}"/>
               </a:ext>
             </a:extLst>
           </p:cNvPr>
@@ -7453,10 +9582,10 @@
       </p:sp>
       <p:pic>
         <p:nvPicPr>
-          <p:cNvPr id="6" name="Picture 5">
-            <a:extLst>
-              <a:ext uri="{FF2B5EF4-FFF2-40B4-BE49-F238E27FC236}">
-                <a16:creationId xmlns:a16="http://schemas.microsoft.com/office/drawing/2014/main" id="{02D8C762-0B4B-4BA0-B560-24801AB89C46}"/>
+          <p:cNvPr id="23" name="Picture 22">
+            <a:extLst>
+              <a:ext uri="{FF2B5EF4-FFF2-40B4-BE49-F238E27FC236}">
+                <a16:creationId xmlns:a16="http://schemas.microsoft.com/office/drawing/2014/main" id="{4E44345A-3A23-48FA-B43E-E7C6ED41FBEE}"/>
               </a:ext>
             </a:extLst>
           </p:cNvPr>
@@ -7466,7 +9595,7 @@
           <p:nvPr/>
         </p:nvPicPr>
         <p:blipFill rotWithShape="1">
-          <a:blip r:embed="rId2" cstate="hqprint">
+          <a:blip r:embed="rId3" cstate="hqprint">
             <a:extLst>
               <a:ext uri="{28A0092B-C50C-407E-A947-70E740481C1C}">
                 <a14:useLocalDpi xmlns:a14="http://schemas.microsoft.com/office/drawing/2010/main" val="0"/>
@@ -7486,12 +9615,143 @@
           </a:prstGeom>
         </p:spPr>
       </p:pic>
+      <p:sp>
+        <p:nvSpPr>
+          <p:cNvPr id="26" name="Slide Number Placeholder 3">
+            <a:extLst>
+              <a:ext uri="{FF2B5EF4-FFF2-40B4-BE49-F238E27FC236}">
+                <a16:creationId xmlns:a16="http://schemas.microsoft.com/office/drawing/2014/main" id="{0AE2B8A8-6598-4EDB-A8D4-B1AF00F1151E}"/>
+              </a:ext>
+            </a:extLst>
+          </p:cNvPr>
+          <p:cNvSpPr txBox="1">
+            <a:spLocks/>
+          </p:cNvSpPr>
+          <p:nvPr/>
+        </p:nvSpPr>
+        <p:spPr>
+          <a:xfrm>
+            <a:off x="0" y="-1027"/>
+            <a:ext cx="3170981" cy="365125"/>
+          </a:xfrm>
+          <a:prstGeom prst="rect">
+            <a:avLst/>
+          </a:prstGeom>
+        </p:spPr>
+        <p:txBody>
+          <a:bodyPr vert="horz" lIns="91440" tIns="45720" rIns="91440" bIns="45720" rtlCol="0" anchor="ctr"/>
+          <a:lstStyle>
+            <a:defPPr>
+              <a:defRPr lang="en-CH"/>
+            </a:defPPr>
+            <a:lvl1pPr marL="0" algn="r" defTabSz="914400" rtl="0" eaLnBrk="1" latinLnBrk="0" hangingPunct="1">
+              <a:defRPr sz="1200" kern="1200">
+                <a:solidFill>
+                  <a:schemeClr val="tx1">
+                    <a:tint val="75000"/>
+                  </a:schemeClr>
+                </a:solidFill>
+                <a:latin typeface="+mn-lt"/>
+                <a:ea typeface="+mn-ea"/>
+                <a:cs typeface="+mn-cs"/>
+              </a:defRPr>
+            </a:lvl1pPr>
+            <a:lvl2pPr marL="457200" algn="l" defTabSz="914400" rtl="0" eaLnBrk="1" latinLnBrk="0" hangingPunct="1">
+              <a:defRPr sz="1800" kern="1200">
+                <a:solidFill>
+                  <a:schemeClr val="tx1"/>
+                </a:solidFill>
+                <a:latin typeface="+mn-lt"/>
+                <a:ea typeface="+mn-ea"/>
+                <a:cs typeface="+mn-cs"/>
+              </a:defRPr>
+            </a:lvl2pPr>
+            <a:lvl3pPr marL="914400" algn="l" defTabSz="914400" rtl="0" eaLnBrk="1" latinLnBrk="0" hangingPunct="1">
+              <a:defRPr sz="1800" kern="1200">
+                <a:solidFill>
+                  <a:schemeClr val="tx1"/>
+                </a:solidFill>
+                <a:latin typeface="+mn-lt"/>
+                <a:ea typeface="+mn-ea"/>
+                <a:cs typeface="+mn-cs"/>
+              </a:defRPr>
+            </a:lvl3pPr>
+            <a:lvl4pPr marL="1371600" algn="l" defTabSz="914400" rtl="0" eaLnBrk="1" latinLnBrk="0" hangingPunct="1">
+              <a:defRPr sz="1800" kern="1200">
+                <a:solidFill>
+                  <a:schemeClr val="tx1"/>
+                </a:solidFill>
+                <a:latin typeface="+mn-lt"/>
+                <a:ea typeface="+mn-ea"/>
+                <a:cs typeface="+mn-cs"/>
+              </a:defRPr>
+            </a:lvl4pPr>
+            <a:lvl5pPr marL="1828800" algn="l" defTabSz="914400" rtl="0" eaLnBrk="1" latinLnBrk="0" hangingPunct="1">
+              <a:defRPr sz="1800" kern="1200">
+                <a:solidFill>
+                  <a:schemeClr val="tx1"/>
+                </a:solidFill>
+                <a:latin typeface="+mn-lt"/>
+                <a:ea typeface="+mn-ea"/>
+                <a:cs typeface="+mn-cs"/>
+              </a:defRPr>
+            </a:lvl5pPr>
+            <a:lvl6pPr marL="2286000" algn="l" defTabSz="914400" rtl="0" eaLnBrk="1" latinLnBrk="0" hangingPunct="1">
+              <a:defRPr sz="1800" kern="1200">
+                <a:solidFill>
+                  <a:schemeClr val="tx1"/>
+                </a:solidFill>
+                <a:latin typeface="+mn-lt"/>
+                <a:ea typeface="+mn-ea"/>
+                <a:cs typeface="+mn-cs"/>
+              </a:defRPr>
+            </a:lvl6pPr>
+            <a:lvl7pPr marL="2743200" algn="l" defTabSz="914400" rtl="0" eaLnBrk="1" latinLnBrk="0" hangingPunct="1">
+              <a:defRPr sz="1800" kern="1200">
+                <a:solidFill>
+                  <a:schemeClr val="tx1"/>
+                </a:solidFill>
+                <a:latin typeface="+mn-lt"/>
+                <a:ea typeface="+mn-ea"/>
+                <a:cs typeface="+mn-cs"/>
+              </a:defRPr>
+            </a:lvl7pPr>
+            <a:lvl8pPr marL="3200400" algn="l" defTabSz="914400" rtl="0" eaLnBrk="1" latinLnBrk="0" hangingPunct="1">
+              <a:defRPr sz="1800" kern="1200">
+                <a:solidFill>
+                  <a:schemeClr val="tx1"/>
+                </a:solidFill>
+                <a:latin typeface="+mn-lt"/>
+                <a:ea typeface="+mn-ea"/>
+                <a:cs typeface="+mn-cs"/>
+              </a:defRPr>
+            </a:lvl8pPr>
+            <a:lvl9pPr marL="3657600" algn="l" defTabSz="914400" rtl="0" eaLnBrk="1" latinLnBrk="0" hangingPunct="1">
+              <a:defRPr sz="1800" kern="1200">
+                <a:solidFill>
+                  <a:schemeClr val="tx1"/>
+                </a:solidFill>
+                <a:latin typeface="+mn-lt"/>
+                <a:ea typeface="+mn-ea"/>
+                <a:cs typeface="+mn-cs"/>
+              </a:defRPr>
+            </a:lvl9pPr>
+          </a:lstStyle>
+          <a:p>
+            <a:r>
+              <a:rPr lang="de-CH" sz="1800" dirty="0"/>
+              <a:t>Präsentation – Usability Tests</a:t>
+            </a:r>
+            <a:endParaRPr lang="en-CH" sz="1800" dirty="0"/>
+          </a:p>
+        </p:txBody>
+      </p:sp>
       <p:pic>
         <p:nvPicPr>
-          <p:cNvPr id="12" name="Grafik 11">
-            <a:extLst>
-              <a:ext uri="{FF2B5EF4-FFF2-40B4-BE49-F238E27FC236}">
-                <a16:creationId xmlns:a16="http://schemas.microsoft.com/office/drawing/2014/main" id="{136D509C-EA4C-44AE-A10D-BCB08991AA89}"/>
+          <p:cNvPr id="4" name="Grafik 3">
+            <a:extLst>
+              <a:ext uri="{FF2B5EF4-FFF2-40B4-BE49-F238E27FC236}">
+                <a16:creationId xmlns:a16="http://schemas.microsoft.com/office/drawing/2014/main" id="{540140F3-A07C-453B-84D7-42D94EBA3C66}"/>
               </a:ext>
             </a:extLst>
           </p:cNvPr>
@@ -7501,15 +9761,21 @@
           <p:nvPr/>
         </p:nvPicPr>
         <p:blipFill>
-          <a:blip r:embed="rId3"/>
+          <a:blip r:embed="rId4">
+            <a:extLst>
+              <a:ext uri="{28A0092B-C50C-407E-A947-70E740481C1C}">
+                <a14:useLocalDpi xmlns:a14="http://schemas.microsoft.com/office/drawing/2010/main" val="0"/>
+              </a:ext>
+            </a:extLst>
+          </a:blip>
           <a:stretch>
             <a:fillRect/>
           </a:stretch>
         </p:blipFill>
         <p:spPr>
           <a:xfrm>
-            <a:off x="3324225" y="1818719"/>
-            <a:ext cx="5543550" cy="4495800"/>
+            <a:off x="2084433" y="1818719"/>
+            <a:ext cx="7539427" cy="4410565"/>
           </a:xfrm>
           <a:prstGeom prst="rect">
             <a:avLst/>
@@ -7519,7 +9785,1256 @@
     </p:spTree>
     <p:extLst>
       <p:ext uri="{BB962C8B-B14F-4D97-AF65-F5344CB8AC3E}">
-        <p14:creationId xmlns:p14="http://schemas.microsoft.com/office/powerpoint/2010/main" val="3592599617"/>
+        <p14:creationId xmlns:p14="http://schemas.microsoft.com/office/powerpoint/2010/main" val="3253586838"/>
+      </p:ext>
+    </p:extLst>
+  </p:cSld>
+  <p:clrMapOvr>
+    <a:masterClrMapping/>
+  </p:clrMapOvr>
+</p:sld>
+</file>
+
+<file path=ppt/slides/slide8.xml><?xml version="1.0" encoding="utf-8"?>
+<p:sld xmlns:a="http://schemas.openxmlformats.org/drawingml/2006/main" xmlns:r="http://schemas.openxmlformats.org/officeDocument/2006/relationships" xmlns:p="http://schemas.openxmlformats.org/presentationml/2006/main">
+  <p:cSld>
+    <p:spTree>
+      <p:nvGrpSpPr>
+        <p:cNvPr id="1" name=""/>
+        <p:cNvGrpSpPr/>
+        <p:nvPr/>
+      </p:nvGrpSpPr>
+      <p:grpSpPr>
+        <a:xfrm>
+          <a:off x="0" y="0"/>
+          <a:ext cx="0" cy="0"/>
+          <a:chOff x="0" y="0"/>
+          <a:chExt cx="0" cy="0"/>
+        </a:xfrm>
+      </p:grpSpPr>
+      <p:sp>
+        <p:nvSpPr>
+          <p:cNvPr id="20" name="Title 1">
+            <a:extLst>
+              <a:ext uri="{FF2B5EF4-FFF2-40B4-BE49-F238E27FC236}">
+                <a16:creationId xmlns:a16="http://schemas.microsoft.com/office/drawing/2014/main" id="{BA7DEFD2-952A-47AA-AB94-829BDDBDD9E4}"/>
+              </a:ext>
+            </a:extLst>
+          </p:cNvPr>
+          <p:cNvSpPr txBox="1">
+            <a:spLocks/>
+          </p:cNvSpPr>
+          <p:nvPr/>
+        </p:nvSpPr>
+        <p:spPr>
+          <a:xfrm>
+            <a:off x="1282147" y="474591"/>
+            <a:ext cx="9144000" cy="886033"/>
+          </a:xfrm>
+          <a:prstGeom prst="rect">
+            <a:avLst/>
+          </a:prstGeom>
+        </p:spPr>
+        <p:txBody>
+          <a:bodyPr vert="horz" lIns="91440" tIns="45720" rIns="91440" bIns="45720" rtlCol="0" anchor="b">
+            <a:normAutofit/>
+          </a:bodyPr>
+          <a:lstStyle>
+            <a:lvl1pPr algn="ctr" defTabSz="914400" rtl="0" eaLnBrk="1" latinLnBrk="0" hangingPunct="1">
+              <a:lnSpc>
+                <a:spcPct val="90000"/>
+              </a:lnSpc>
+              <a:spcBef>
+                <a:spcPct val="0"/>
+              </a:spcBef>
+              <a:buNone/>
+              <a:defRPr sz="6000" kern="1200">
+                <a:solidFill>
+                  <a:schemeClr val="tx1"/>
+                </a:solidFill>
+                <a:latin typeface="+mj-lt"/>
+                <a:ea typeface="+mj-ea"/>
+                <a:cs typeface="+mj-cs"/>
+              </a:defRPr>
+            </a:lvl1pPr>
+          </a:lstStyle>
+          <a:p>
+            <a:r>
+              <a:rPr lang="de-CH" sz="4800" dirty="0"/>
+              <a:t>Positives Feedback</a:t>
+            </a:r>
+            <a:endParaRPr lang="en-CH" sz="4800" dirty="0"/>
+          </a:p>
+        </p:txBody>
+      </p:sp>
+      <p:sp>
+        <p:nvSpPr>
+          <p:cNvPr id="21" name="Subtitle 2">
+            <a:extLst>
+              <a:ext uri="{FF2B5EF4-FFF2-40B4-BE49-F238E27FC236}">
+                <a16:creationId xmlns:a16="http://schemas.microsoft.com/office/drawing/2014/main" id="{8333B1ED-AB10-4243-A67B-CC404ABFDF61}"/>
+              </a:ext>
+            </a:extLst>
+          </p:cNvPr>
+          <p:cNvSpPr txBox="1">
+            <a:spLocks/>
+          </p:cNvSpPr>
+          <p:nvPr/>
+        </p:nvSpPr>
+        <p:spPr>
+          <a:xfrm>
+            <a:off x="1282146" y="1818719"/>
+            <a:ext cx="9751614" cy="2922246"/>
+          </a:xfrm>
+          <a:prstGeom prst="rect">
+            <a:avLst/>
+          </a:prstGeom>
+        </p:spPr>
+        <p:txBody>
+          <a:bodyPr vert="horz" lIns="91440" tIns="45720" rIns="91440" bIns="45720" rtlCol="0">
+            <a:normAutofit/>
+          </a:bodyPr>
+          <a:lstStyle>
+            <a:lvl1pPr marL="0" indent="0" algn="ctr" defTabSz="914400" rtl="0" eaLnBrk="1" latinLnBrk="0" hangingPunct="1">
+              <a:lnSpc>
+                <a:spcPct val="90000"/>
+              </a:lnSpc>
+              <a:spcBef>
+                <a:spcPts val="1000"/>
+              </a:spcBef>
+              <a:buFont typeface="Arial" panose="020B0604020202020204" pitchFamily="34" charset="0"/>
+              <a:buNone/>
+              <a:defRPr sz="2400" kern="1200">
+                <a:solidFill>
+                  <a:schemeClr val="tx1"/>
+                </a:solidFill>
+                <a:latin typeface="+mn-lt"/>
+                <a:ea typeface="+mn-ea"/>
+                <a:cs typeface="+mn-cs"/>
+              </a:defRPr>
+            </a:lvl1pPr>
+            <a:lvl2pPr marL="457200" indent="0" algn="ctr" defTabSz="914400" rtl="0" eaLnBrk="1" latinLnBrk="0" hangingPunct="1">
+              <a:lnSpc>
+                <a:spcPct val="90000"/>
+              </a:lnSpc>
+              <a:spcBef>
+                <a:spcPts val="500"/>
+              </a:spcBef>
+              <a:buFont typeface="Arial" panose="020B0604020202020204" pitchFamily="34" charset="0"/>
+              <a:buNone/>
+              <a:defRPr sz="2000" kern="1200">
+                <a:solidFill>
+                  <a:schemeClr val="tx1"/>
+                </a:solidFill>
+                <a:latin typeface="+mn-lt"/>
+                <a:ea typeface="+mn-ea"/>
+                <a:cs typeface="+mn-cs"/>
+              </a:defRPr>
+            </a:lvl2pPr>
+            <a:lvl3pPr marL="914400" indent="0" algn="ctr" defTabSz="914400" rtl="0" eaLnBrk="1" latinLnBrk="0" hangingPunct="1">
+              <a:lnSpc>
+                <a:spcPct val="90000"/>
+              </a:lnSpc>
+              <a:spcBef>
+                <a:spcPts val="500"/>
+              </a:spcBef>
+              <a:buFont typeface="Arial" panose="020B0604020202020204" pitchFamily="34" charset="0"/>
+              <a:buNone/>
+              <a:defRPr sz="1800" kern="1200">
+                <a:solidFill>
+                  <a:schemeClr val="tx1"/>
+                </a:solidFill>
+                <a:latin typeface="+mn-lt"/>
+                <a:ea typeface="+mn-ea"/>
+                <a:cs typeface="+mn-cs"/>
+              </a:defRPr>
+            </a:lvl3pPr>
+            <a:lvl4pPr marL="1371600" indent="0" algn="ctr" defTabSz="914400" rtl="0" eaLnBrk="1" latinLnBrk="0" hangingPunct="1">
+              <a:lnSpc>
+                <a:spcPct val="90000"/>
+              </a:lnSpc>
+              <a:spcBef>
+                <a:spcPts val="500"/>
+              </a:spcBef>
+              <a:buFont typeface="Arial" panose="020B0604020202020204" pitchFamily="34" charset="0"/>
+              <a:buNone/>
+              <a:defRPr sz="1600" kern="1200">
+                <a:solidFill>
+                  <a:schemeClr val="tx1"/>
+                </a:solidFill>
+                <a:latin typeface="+mn-lt"/>
+                <a:ea typeface="+mn-ea"/>
+                <a:cs typeface="+mn-cs"/>
+              </a:defRPr>
+            </a:lvl4pPr>
+            <a:lvl5pPr marL="1828800" indent="0" algn="ctr" defTabSz="914400" rtl="0" eaLnBrk="1" latinLnBrk="0" hangingPunct="1">
+              <a:lnSpc>
+                <a:spcPct val="90000"/>
+              </a:lnSpc>
+              <a:spcBef>
+                <a:spcPts val="500"/>
+              </a:spcBef>
+              <a:buFont typeface="Arial" panose="020B0604020202020204" pitchFamily="34" charset="0"/>
+              <a:buNone/>
+              <a:defRPr sz="1600" kern="1200">
+                <a:solidFill>
+                  <a:schemeClr val="tx1"/>
+                </a:solidFill>
+                <a:latin typeface="+mn-lt"/>
+                <a:ea typeface="+mn-ea"/>
+                <a:cs typeface="+mn-cs"/>
+              </a:defRPr>
+            </a:lvl5pPr>
+            <a:lvl6pPr marL="2286000" indent="0" algn="ctr" defTabSz="914400" rtl="0" eaLnBrk="1" latinLnBrk="0" hangingPunct="1">
+              <a:lnSpc>
+                <a:spcPct val="90000"/>
+              </a:lnSpc>
+              <a:spcBef>
+                <a:spcPts val="500"/>
+              </a:spcBef>
+              <a:buFont typeface="Arial" panose="020B0604020202020204" pitchFamily="34" charset="0"/>
+              <a:buNone/>
+              <a:defRPr sz="1600" kern="1200">
+                <a:solidFill>
+                  <a:schemeClr val="tx1"/>
+                </a:solidFill>
+                <a:latin typeface="+mn-lt"/>
+                <a:ea typeface="+mn-ea"/>
+                <a:cs typeface="+mn-cs"/>
+              </a:defRPr>
+            </a:lvl6pPr>
+            <a:lvl7pPr marL="2743200" indent="0" algn="ctr" defTabSz="914400" rtl="0" eaLnBrk="1" latinLnBrk="0" hangingPunct="1">
+              <a:lnSpc>
+                <a:spcPct val="90000"/>
+              </a:lnSpc>
+              <a:spcBef>
+                <a:spcPts val="500"/>
+              </a:spcBef>
+              <a:buFont typeface="Arial" panose="020B0604020202020204" pitchFamily="34" charset="0"/>
+              <a:buNone/>
+              <a:defRPr sz="1600" kern="1200">
+                <a:solidFill>
+                  <a:schemeClr val="tx1"/>
+                </a:solidFill>
+                <a:latin typeface="+mn-lt"/>
+                <a:ea typeface="+mn-ea"/>
+                <a:cs typeface="+mn-cs"/>
+              </a:defRPr>
+            </a:lvl7pPr>
+            <a:lvl8pPr marL="3200400" indent="0" algn="ctr" defTabSz="914400" rtl="0" eaLnBrk="1" latinLnBrk="0" hangingPunct="1">
+              <a:lnSpc>
+                <a:spcPct val="90000"/>
+              </a:lnSpc>
+              <a:spcBef>
+                <a:spcPts val="500"/>
+              </a:spcBef>
+              <a:buFont typeface="Arial" panose="020B0604020202020204" pitchFamily="34" charset="0"/>
+              <a:buNone/>
+              <a:defRPr sz="1600" kern="1200">
+                <a:solidFill>
+                  <a:schemeClr val="tx1"/>
+                </a:solidFill>
+                <a:latin typeface="+mn-lt"/>
+                <a:ea typeface="+mn-ea"/>
+                <a:cs typeface="+mn-cs"/>
+              </a:defRPr>
+            </a:lvl8pPr>
+            <a:lvl9pPr marL="3657600" indent="0" algn="ctr" defTabSz="914400" rtl="0" eaLnBrk="1" latinLnBrk="0" hangingPunct="1">
+              <a:lnSpc>
+                <a:spcPct val="90000"/>
+              </a:lnSpc>
+              <a:spcBef>
+                <a:spcPts val="500"/>
+              </a:spcBef>
+              <a:buFont typeface="Arial" panose="020B0604020202020204" pitchFamily="34" charset="0"/>
+              <a:buNone/>
+              <a:defRPr sz="1600" kern="1200">
+                <a:solidFill>
+                  <a:schemeClr val="tx1"/>
+                </a:solidFill>
+                <a:latin typeface="+mn-lt"/>
+                <a:ea typeface="+mn-ea"/>
+                <a:cs typeface="+mn-cs"/>
+              </a:defRPr>
+            </a:lvl9pPr>
+          </a:lstStyle>
+          <a:p>
+            <a:pPr marL="342900" indent="-342900" algn="l">
+              <a:buFont typeface="Arial" panose="020B0604020202020204" pitchFamily="34" charset="0"/>
+              <a:buChar char="•"/>
+            </a:pPr>
+            <a:endParaRPr lang="en-CH" dirty="0"/>
+          </a:p>
+        </p:txBody>
+      </p:sp>
+      <p:sp>
+        <p:nvSpPr>
+          <p:cNvPr id="22" name="Slide Number Placeholder 3">
+            <a:extLst>
+              <a:ext uri="{FF2B5EF4-FFF2-40B4-BE49-F238E27FC236}">
+                <a16:creationId xmlns:a16="http://schemas.microsoft.com/office/drawing/2014/main" id="{30CC832F-1DF6-496C-AEBF-2FE46D26053A}"/>
+              </a:ext>
+            </a:extLst>
+          </p:cNvPr>
+          <p:cNvSpPr>
+            <a:spLocks noGrp="1"/>
+          </p:cNvSpPr>
+          <p:nvPr>
+            <p:ph type="sldNum" sz="quarter" idx="12"/>
+          </p:nvPr>
+        </p:nvSpPr>
+        <p:spPr>
+          <a:xfrm>
+            <a:off x="9054547" y="6386167"/>
+            <a:ext cx="2743200" cy="365125"/>
+          </a:xfrm>
+        </p:spPr>
+        <p:txBody>
+          <a:bodyPr/>
+          <a:lstStyle/>
+          <a:p>
+            <a:r>
+              <a:rPr lang="de-CH" sz="1800" dirty="0"/>
+              <a:t>Seite </a:t>
+            </a:r>
+            <a:fld id="{AA18215A-2065-42F3-B327-F66581BA1A17}" type="slidenum">
+              <a:rPr lang="en-CH" sz="1800" smtClean="0"/>
+              <a:t>8</a:t>
+            </a:fld>
+            <a:endParaRPr lang="en-CH" sz="1800" dirty="0"/>
+          </a:p>
+        </p:txBody>
+      </p:sp>
+      <p:pic>
+        <p:nvPicPr>
+          <p:cNvPr id="23" name="Picture 22">
+            <a:extLst>
+              <a:ext uri="{FF2B5EF4-FFF2-40B4-BE49-F238E27FC236}">
+                <a16:creationId xmlns:a16="http://schemas.microsoft.com/office/drawing/2014/main" id="{4E44345A-3A23-48FA-B43E-E7C6ED41FBEE}"/>
+              </a:ext>
+            </a:extLst>
+          </p:cNvPr>
+          <p:cNvPicPr>
+            <a:picLocks noChangeAspect="1"/>
+          </p:cNvPicPr>
+          <p:nvPr/>
+        </p:nvPicPr>
+        <p:blipFill rotWithShape="1">
+          <a:blip r:embed="rId3" cstate="hqprint">
+            <a:extLst>
+              <a:ext uri="{28A0092B-C50C-407E-A947-70E740481C1C}">
+                <a14:useLocalDpi xmlns:a14="http://schemas.microsoft.com/office/drawing/2010/main" val="0"/>
+              </a:ext>
+            </a:extLst>
+          </a:blip>
+          <a:srcRect l="12899" t="12899" r="12899" b="12899"/>
+          <a:stretch/>
+        </p:blipFill>
+        <p:spPr>
+          <a:xfrm flipH="1">
+            <a:off x="10426147" y="16496"/>
+            <a:ext cx="1765852" cy="1802225"/>
+          </a:xfrm>
+          <a:prstGeom prst="rect">
+            <a:avLst/>
+          </a:prstGeom>
+        </p:spPr>
+      </p:pic>
+      <p:sp>
+        <p:nvSpPr>
+          <p:cNvPr id="26" name="Slide Number Placeholder 3">
+            <a:extLst>
+              <a:ext uri="{FF2B5EF4-FFF2-40B4-BE49-F238E27FC236}">
+                <a16:creationId xmlns:a16="http://schemas.microsoft.com/office/drawing/2014/main" id="{0AE2B8A8-6598-4EDB-A8D4-B1AF00F1151E}"/>
+              </a:ext>
+            </a:extLst>
+          </p:cNvPr>
+          <p:cNvSpPr txBox="1">
+            <a:spLocks/>
+          </p:cNvSpPr>
+          <p:nvPr/>
+        </p:nvSpPr>
+        <p:spPr>
+          <a:xfrm>
+            <a:off x="0" y="-1027"/>
+            <a:ext cx="3170981" cy="365125"/>
+          </a:xfrm>
+          <a:prstGeom prst="rect">
+            <a:avLst/>
+          </a:prstGeom>
+        </p:spPr>
+        <p:txBody>
+          <a:bodyPr vert="horz" lIns="91440" tIns="45720" rIns="91440" bIns="45720" rtlCol="0" anchor="ctr"/>
+          <a:lstStyle>
+            <a:defPPr>
+              <a:defRPr lang="en-CH"/>
+            </a:defPPr>
+            <a:lvl1pPr marL="0" algn="r" defTabSz="914400" rtl="0" eaLnBrk="1" latinLnBrk="0" hangingPunct="1">
+              <a:defRPr sz="1200" kern="1200">
+                <a:solidFill>
+                  <a:schemeClr val="tx1">
+                    <a:tint val="75000"/>
+                  </a:schemeClr>
+                </a:solidFill>
+                <a:latin typeface="+mn-lt"/>
+                <a:ea typeface="+mn-ea"/>
+                <a:cs typeface="+mn-cs"/>
+              </a:defRPr>
+            </a:lvl1pPr>
+            <a:lvl2pPr marL="457200" algn="l" defTabSz="914400" rtl="0" eaLnBrk="1" latinLnBrk="0" hangingPunct="1">
+              <a:defRPr sz="1800" kern="1200">
+                <a:solidFill>
+                  <a:schemeClr val="tx1"/>
+                </a:solidFill>
+                <a:latin typeface="+mn-lt"/>
+                <a:ea typeface="+mn-ea"/>
+                <a:cs typeface="+mn-cs"/>
+              </a:defRPr>
+            </a:lvl2pPr>
+            <a:lvl3pPr marL="914400" algn="l" defTabSz="914400" rtl="0" eaLnBrk="1" latinLnBrk="0" hangingPunct="1">
+              <a:defRPr sz="1800" kern="1200">
+                <a:solidFill>
+                  <a:schemeClr val="tx1"/>
+                </a:solidFill>
+                <a:latin typeface="+mn-lt"/>
+                <a:ea typeface="+mn-ea"/>
+                <a:cs typeface="+mn-cs"/>
+              </a:defRPr>
+            </a:lvl3pPr>
+            <a:lvl4pPr marL="1371600" algn="l" defTabSz="914400" rtl="0" eaLnBrk="1" latinLnBrk="0" hangingPunct="1">
+              <a:defRPr sz="1800" kern="1200">
+                <a:solidFill>
+                  <a:schemeClr val="tx1"/>
+                </a:solidFill>
+                <a:latin typeface="+mn-lt"/>
+                <a:ea typeface="+mn-ea"/>
+                <a:cs typeface="+mn-cs"/>
+              </a:defRPr>
+            </a:lvl4pPr>
+            <a:lvl5pPr marL="1828800" algn="l" defTabSz="914400" rtl="0" eaLnBrk="1" latinLnBrk="0" hangingPunct="1">
+              <a:defRPr sz="1800" kern="1200">
+                <a:solidFill>
+                  <a:schemeClr val="tx1"/>
+                </a:solidFill>
+                <a:latin typeface="+mn-lt"/>
+                <a:ea typeface="+mn-ea"/>
+                <a:cs typeface="+mn-cs"/>
+              </a:defRPr>
+            </a:lvl5pPr>
+            <a:lvl6pPr marL="2286000" algn="l" defTabSz="914400" rtl="0" eaLnBrk="1" latinLnBrk="0" hangingPunct="1">
+              <a:defRPr sz="1800" kern="1200">
+                <a:solidFill>
+                  <a:schemeClr val="tx1"/>
+                </a:solidFill>
+                <a:latin typeface="+mn-lt"/>
+                <a:ea typeface="+mn-ea"/>
+                <a:cs typeface="+mn-cs"/>
+              </a:defRPr>
+            </a:lvl6pPr>
+            <a:lvl7pPr marL="2743200" algn="l" defTabSz="914400" rtl="0" eaLnBrk="1" latinLnBrk="0" hangingPunct="1">
+              <a:defRPr sz="1800" kern="1200">
+                <a:solidFill>
+                  <a:schemeClr val="tx1"/>
+                </a:solidFill>
+                <a:latin typeface="+mn-lt"/>
+                <a:ea typeface="+mn-ea"/>
+                <a:cs typeface="+mn-cs"/>
+              </a:defRPr>
+            </a:lvl7pPr>
+            <a:lvl8pPr marL="3200400" algn="l" defTabSz="914400" rtl="0" eaLnBrk="1" latinLnBrk="0" hangingPunct="1">
+              <a:defRPr sz="1800" kern="1200">
+                <a:solidFill>
+                  <a:schemeClr val="tx1"/>
+                </a:solidFill>
+                <a:latin typeface="+mn-lt"/>
+                <a:ea typeface="+mn-ea"/>
+                <a:cs typeface="+mn-cs"/>
+              </a:defRPr>
+            </a:lvl8pPr>
+            <a:lvl9pPr marL="3657600" algn="l" defTabSz="914400" rtl="0" eaLnBrk="1" latinLnBrk="0" hangingPunct="1">
+              <a:defRPr sz="1800" kern="1200">
+                <a:solidFill>
+                  <a:schemeClr val="tx1"/>
+                </a:solidFill>
+                <a:latin typeface="+mn-lt"/>
+                <a:ea typeface="+mn-ea"/>
+                <a:cs typeface="+mn-cs"/>
+              </a:defRPr>
+            </a:lvl9pPr>
+          </a:lstStyle>
+          <a:p>
+            <a:r>
+              <a:rPr lang="de-CH" sz="1800" dirty="0"/>
+              <a:t>Präsentation – Usability Tests</a:t>
+            </a:r>
+            <a:endParaRPr lang="en-CH" sz="1800" dirty="0"/>
+          </a:p>
+        </p:txBody>
+      </p:sp>
+      <p:sp>
+        <p:nvSpPr>
+          <p:cNvPr id="8" name="Subtitle 2">
+            <a:extLst>
+              <a:ext uri="{FF2B5EF4-FFF2-40B4-BE49-F238E27FC236}">
+                <a16:creationId xmlns:a16="http://schemas.microsoft.com/office/drawing/2014/main" id="{1831DB9A-371F-42E5-A5A0-5EA291AD09F6}"/>
+              </a:ext>
+            </a:extLst>
+          </p:cNvPr>
+          <p:cNvSpPr txBox="1">
+            <a:spLocks/>
+          </p:cNvSpPr>
+          <p:nvPr/>
+        </p:nvSpPr>
+        <p:spPr>
+          <a:xfrm>
+            <a:off x="1434546" y="1971118"/>
+            <a:ext cx="8802274" cy="3571037"/>
+          </a:xfrm>
+          <a:prstGeom prst="rect">
+            <a:avLst/>
+          </a:prstGeom>
+        </p:spPr>
+        <p:txBody>
+          <a:bodyPr vert="horz" lIns="91440" tIns="45720" rIns="91440" bIns="45720" rtlCol="0">
+            <a:normAutofit/>
+          </a:bodyPr>
+          <a:lstStyle>
+            <a:lvl1pPr marL="0" indent="0" algn="ctr" defTabSz="914400" rtl="0" eaLnBrk="1" latinLnBrk="0" hangingPunct="1">
+              <a:lnSpc>
+                <a:spcPct val="90000"/>
+              </a:lnSpc>
+              <a:spcBef>
+                <a:spcPts val="1000"/>
+              </a:spcBef>
+              <a:buFont typeface="Arial" panose="020B0604020202020204" pitchFamily="34" charset="0"/>
+              <a:buNone/>
+              <a:defRPr sz="2400" kern="1200">
+                <a:solidFill>
+                  <a:schemeClr val="tx1"/>
+                </a:solidFill>
+                <a:latin typeface="+mn-lt"/>
+                <a:ea typeface="+mn-ea"/>
+                <a:cs typeface="+mn-cs"/>
+              </a:defRPr>
+            </a:lvl1pPr>
+            <a:lvl2pPr marL="457200" indent="0" algn="ctr" defTabSz="914400" rtl="0" eaLnBrk="1" latinLnBrk="0" hangingPunct="1">
+              <a:lnSpc>
+                <a:spcPct val="90000"/>
+              </a:lnSpc>
+              <a:spcBef>
+                <a:spcPts val="500"/>
+              </a:spcBef>
+              <a:buFont typeface="Arial" panose="020B0604020202020204" pitchFamily="34" charset="0"/>
+              <a:buNone/>
+              <a:defRPr sz="2000" kern="1200">
+                <a:solidFill>
+                  <a:schemeClr val="tx1"/>
+                </a:solidFill>
+                <a:latin typeface="+mn-lt"/>
+                <a:ea typeface="+mn-ea"/>
+                <a:cs typeface="+mn-cs"/>
+              </a:defRPr>
+            </a:lvl2pPr>
+            <a:lvl3pPr marL="914400" indent="0" algn="ctr" defTabSz="914400" rtl="0" eaLnBrk="1" latinLnBrk="0" hangingPunct="1">
+              <a:lnSpc>
+                <a:spcPct val="90000"/>
+              </a:lnSpc>
+              <a:spcBef>
+                <a:spcPts val="500"/>
+              </a:spcBef>
+              <a:buFont typeface="Arial" panose="020B0604020202020204" pitchFamily="34" charset="0"/>
+              <a:buNone/>
+              <a:defRPr sz="1800" kern="1200">
+                <a:solidFill>
+                  <a:schemeClr val="tx1"/>
+                </a:solidFill>
+                <a:latin typeface="+mn-lt"/>
+                <a:ea typeface="+mn-ea"/>
+                <a:cs typeface="+mn-cs"/>
+              </a:defRPr>
+            </a:lvl3pPr>
+            <a:lvl4pPr marL="1371600" indent="0" algn="ctr" defTabSz="914400" rtl="0" eaLnBrk="1" latinLnBrk="0" hangingPunct="1">
+              <a:lnSpc>
+                <a:spcPct val="90000"/>
+              </a:lnSpc>
+              <a:spcBef>
+                <a:spcPts val="500"/>
+              </a:spcBef>
+              <a:buFont typeface="Arial" panose="020B0604020202020204" pitchFamily="34" charset="0"/>
+              <a:buNone/>
+              <a:defRPr sz="1600" kern="1200">
+                <a:solidFill>
+                  <a:schemeClr val="tx1"/>
+                </a:solidFill>
+                <a:latin typeface="+mn-lt"/>
+                <a:ea typeface="+mn-ea"/>
+                <a:cs typeface="+mn-cs"/>
+              </a:defRPr>
+            </a:lvl4pPr>
+            <a:lvl5pPr marL="1828800" indent="0" algn="ctr" defTabSz="914400" rtl="0" eaLnBrk="1" latinLnBrk="0" hangingPunct="1">
+              <a:lnSpc>
+                <a:spcPct val="90000"/>
+              </a:lnSpc>
+              <a:spcBef>
+                <a:spcPts val="500"/>
+              </a:spcBef>
+              <a:buFont typeface="Arial" panose="020B0604020202020204" pitchFamily="34" charset="0"/>
+              <a:buNone/>
+              <a:defRPr sz="1600" kern="1200">
+                <a:solidFill>
+                  <a:schemeClr val="tx1"/>
+                </a:solidFill>
+                <a:latin typeface="+mn-lt"/>
+                <a:ea typeface="+mn-ea"/>
+                <a:cs typeface="+mn-cs"/>
+              </a:defRPr>
+            </a:lvl5pPr>
+            <a:lvl6pPr marL="2286000" indent="0" algn="ctr" defTabSz="914400" rtl="0" eaLnBrk="1" latinLnBrk="0" hangingPunct="1">
+              <a:lnSpc>
+                <a:spcPct val="90000"/>
+              </a:lnSpc>
+              <a:spcBef>
+                <a:spcPts val="500"/>
+              </a:spcBef>
+              <a:buFont typeface="Arial" panose="020B0604020202020204" pitchFamily="34" charset="0"/>
+              <a:buNone/>
+              <a:defRPr sz="1600" kern="1200">
+                <a:solidFill>
+                  <a:schemeClr val="tx1"/>
+                </a:solidFill>
+                <a:latin typeface="+mn-lt"/>
+                <a:ea typeface="+mn-ea"/>
+                <a:cs typeface="+mn-cs"/>
+              </a:defRPr>
+            </a:lvl6pPr>
+            <a:lvl7pPr marL="2743200" indent="0" algn="ctr" defTabSz="914400" rtl="0" eaLnBrk="1" latinLnBrk="0" hangingPunct="1">
+              <a:lnSpc>
+                <a:spcPct val="90000"/>
+              </a:lnSpc>
+              <a:spcBef>
+                <a:spcPts val="500"/>
+              </a:spcBef>
+              <a:buFont typeface="Arial" panose="020B0604020202020204" pitchFamily="34" charset="0"/>
+              <a:buNone/>
+              <a:defRPr sz="1600" kern="1200">
+                <a:solidFill>
+                  <a:schemeClr val="tx1"/>
+                </a:solidFill>
+                <a:latin typeface="+mn-lt"/>
+                <a:ea typeface="+mn-ea"/>
+                <a:cs typeface="+mn-cs"/>
+              </a:defRPr>
+            </a:lvl7pPr>
+            <a:lvl8pPr marL="3200400" indent="0" algn="ctr" defTabSz="914400" rtl="0" eaLnBrk="1" latinLnBrk="0" hangingPunct="1">
+              <a:lnSpc>
+                <a:spcPct val="90000"/>
+              </a:lnSpc>
+              <a:spcBef>
+                <a:spcPts val="500"/>
+              </a:spcBef>
+              <a:buFont typeface="Arial" panose="020B0604020202020204" pitchFamily="34" charset="0"/>
+              <a:buNone/>
+              <a:defRPr sz="1600" kern="1200">
+                <a:solidFill>
+                  <a:schemeClr val="tx1"/>
+                </a:solidFill>
+                <a:latin typeface="+mn-lt"/>
+                <a:ea typeface="+mn-ea"/>
+                <a:cs typeface="+mn-cs"/>
+              </a:defRPr>
+            </a:lvl8pPr>
+            <a:lvl9pPr marL="3657600" indent="0" algn="ctr" defTabSz="914400" rtl="0" eaLnBrk="1" latinLnBrk="0" hangingPunct="1">
+              <a:lnSpc>
+                <a:spcPct val="90000"/>
+              </a:lnSpc>
+              <a:spcBef>
+                <a:spcPts val="500"/>
+              </a:spcBef>
+              <a:buFont typeface="Arial" panose="020B0604020202020204" pitchFamily="34" charset="0"/>
+              <a:buNone/>
+              <a:defRPr sz="1600" kern="1200">
+                <a:solidFill>
+                  <a:schemeClr val="tx1"/>
+                </a:solidFill>
+                <a:latin typeface="+mn-lt"/>
+                <a:ea typeface="+mn-ea"/>
+                <a:cs typeface="+mn-cs"/>
+              </a:defRPr>
+            </a:lvl9pPr>
+          </a:lstStyle>
+          <a:p>
+            <a:pPr marL="342900" indent="-342900" algn="l">
+              <a:buFont typeface="Arial" panose="020B0604020202020204" pitchFamily="34" charset="0"/>
+              <a:buChar char="•"/>
+            </a:pPr>
+            <a:r>
+              <a:rPr lang="de-CH" dirty="0"/>
+              <a:t>Drag/Drop fühlt sich gut an</a:t>
+            </a:r>
+          </a:p>
+          <a:p>
+            <a:pPr marL="342900" indent="-342900" algn="l">
+              <a:buFont typeface="Arial" panose="020B0604020202020204" pitchFamily="34" charset="0"/>
+              <a:buChar char="•"/>
+            </a:pPr>
+            <a:r>
+              <a:rPr lang="de-CH" dirty="0"/>
+              <a:t>Grafiken sehen gut aus und passen zum Spiel</a:t>
+            </a:r>
+          </a:p>
+          <a:p>
+            <a:pPr marL="342900" indent="-342900" algn="l">
+              <a:buFont typeface="Arial" panose="020B0604020202020204" pitchFamily="34" charset="0"/>
+              <a:buChar char="•"/>
+            </a:pPr>
+            <a:r>
+              <a:rPr lang="de-CH" dirty="0"/>
+              <a:t>Keine Ladezeiten, schnelle Reaktion auf Input</a:t>
+            </a:r>
+            <a:endParaRPr lang="en-CH" dirty="0"/>
+          </a:p>
+        </p:txBody>
+      </p:sp>
+    </p:spTree>
+    <p:extLst>
+      <p:ext uri="{BB962C8B-B14F-4D97-AF65-F5344CB8AC3E}">
+        <p14:creationId xmlns:p14="http://schemas.microsoft.com/office/powerpoint/2010/main" val="2608350810"/>
+      </p:ext>
+    </p:extLst>
+  </p:cSld>
+  <p:clrMapOvr>
+    <a:masterClrMapping/>
+  </p:clrMapOvr>
+</p:sld>
+</file>
+
+<file path=ppt/slides/slide9.xml><?xml version="1.0" encoding="utf-8"?>
+<p:sld xmlns:a="http://schemas.openxmlformats.org/drawingml/2006/main" xmlns:r="http://schemas.openxmlformats.org/officeDocument/2006/relationships" xmlns:p="http://schemas.openxmlformats.org/presentationml/2006/main">
+  <p:cSld>
+    <p:spTree>
+      <p:nvGrpSpPr>
+        <p:cNvPr id="1" name=""/>
+        <p:cNvGrpSpPr/>
+        <p:nvPr/>
+      </p:nvGrpSpPr>
+      <p:grpSpPr>
+        <a:xfrm>
+          <a:off x="0" y="0"/>
+          <a:ext cx="0" cy="0"/>
+          <a:chOff x="0" y="0"/>
+          <a:chExt cx="0" cy="0"/>
+        </a:xfrm>
+      </p:grpSpPr>
+      <p:sp>
+        <p:nvSpPr>
+          <p:cNvPr id="20" name="Title 1">
+            <a:extLst>
+              <a:ext uri="{FF2B5EF4-FFF2-40B4-BE49-F238E27FC236}">
+                <a16:creationId xmlns:a16="http://schemas.microsoft.com/office/drawing/2014/main" id="{BA7DEFD2-952A-47AA-AB94-829BDDBDD9E4}"/>
+              </a:ext>
+            </a:extLst>
+          </p:cNvPr>
+          <p:cNvSpPr txBox="1">
+            <a:spLocks/>
+          </p:cNvSpPr>
+          <p:nvPr/>
+        </p:nvSpPr>
+        <p:spPr>
+          <a:xfrm>
+            <a:off x="1282147" y="474591"/>
+            <a:ext cx="9144000" cy="886033"/>
+          </a:xfrm>
+          <a:prstGeom prst="rect">
+            <a:avLst/>
+          </a:prstGeom>
+        </p:spPr>
+        <p:txBody>
+          <a:bodyPr vert="horz" lIns="91440" tIns="45720" rIns="91440" bIns="45720" rtlCol="0" anchor="b">
+            <a:normAutofit/>
+          </a:bodyPr>
+          <a:lstStyle>
+            <a:lvl1pPr algn="ctr" defTabSz="914400" rtl="0" eaLnBrk="1" latinLnBrk="0" hangingPunct="1">
+              <a:lnSpc>
+                <a:spcPct val="90000"/>
+              </a:lnSpc>
+              <a:spcBef>
+                <a:spcPct val="0"/>
+              </a:spcBef>
+              <a:buNone/>
+              <a:defRPr sz="6000" kern="1200">
+                <a:solidFill>
+                  <a:schemeClr val="tx1"/>
+                </a:solidFill>
+                <a:latin typeface="+mj-lt"/>
+                <a:ea typeface="+mj-ea"/>
+                <a:cs typeface="+mj-cs"/>
+              </a:defRPr>
+            </a:lvl1pPr>
+          </a:lstStyle>
+          <a:p>
+            <a:r>
+              <a:rPr lang="de-CH" sz="4800" dirty="0"/>
+              <a:t>Unsere Beobachtungen</a:t>
+            </a:r>
+            <a:endParaRPr lang="en-CH" sz="4800" dirty="0"/>
+          </a:p>
+        </p:txBody>
+      </p:sp>
+      <p:sp>
+        <p:nvSpPr>
+          <p:cNvPr id="21" name="Subtitle 2">
+            <a:extLst>
+              <a:ext uri="{FF2B5EF4-FFF2-40B4-BE49-F238E27FC236}">
+                <a16:creationId xmlns:a16="http://schemas.microsoft.com/office/drawing/2014/main" id="{8333B1ED-AB10-4243-A67B-CC404ABFDF61}"/>
+              </a:ext>
+            </a:extLst>
+          </p:cNvPr>
+          <p:cNvSpPr txBox="1">
+            <a:spLocks/>
+          </p:cNvSpPr>
+          <p:nvPr/>
+        </p:nvSpPr>
+        <p:spPr>
+          <a:xfrm>
+            <a:off x="1293297" y="1818719"/>
+            <a:ext cx="9751614" cy="2922246"/>
+          </a:xfrm>
+          <a:prstGeom prst="rect">
+            <a:avLst/>
+          </a:prstGeom>
+        </p:spPr>
+        <p:txBody>
+          <a:bodyPr vert="horz" lIns="91440" tIns="45720" rIns="91440" bIns="45720" rtlCol="0">
+            <a:normAutofit/>
+          </a:bodyPr>
+          <a:lstStyle>
+            <a:lvl1pPr marL="0" indent="0" algn="ctr" defTabSz="914400" rtl="0" eaLnBrk="1" latinLnBrk="0" hangingPunct="1">
+              <a:lnSpc>
+                <a:spcPct val="90000"/>
+              </a:lnSpc>
+              <a:spcBef>
+                <a:spcPts val="1000"/>
+              </a:spcBef>
+              <a:buFont typeface="Arial" panose="020B0604020202020204" pitchFamily="34" charset="0"/>
+              <a:buNone/>
+              <a:defRPr sz="2400" kern="1200">
+                <a:solidFill>
+                  <a:schemeClr val="tx1"/>
+                </a:solidFill>
+                <a:latin typeface="+mn-lt"/>
+                <a:ea typeface="+mn-ea"/>
+                <a:cs typeface="+mn-cs"/>
+              </a:defRPr>
+            </a:lvl1pPr>
+            <a:lvl2pPr marL="457200" indent="0" algn="ctr" defTabSz="914400" rtl="0" eaLnBrk="1" latinLnBrk="0" hangingPunct="1">
+              <a:lnSpc>
+                <a:spcPct val="90000"/>
+              </a:lnSpc>
+              <a:spcBef>
+                <a:spcPts val="500"/>
+              </a:spcBef>
+              <a:buFont typeface="Arial" panose="020B0604020202020204" pitchFamily="34" charset="0"/>
+              <a:buNone/>
+              <a:defRPr sz="2000" kern="1200">
+                <a:solidFill>
+                  <a:schemeClr val="tx1"/>
+                </a:solidFill>
+                <a:latin typeface="+mn-lt"/>
+                <a:ea typeface="+mn-ea"/>
+                <a:cs typeface="+mn-cs"/>
+              </a:defRPr>
+            </a:lvl2pPr>
+            <a:lvl3pPr marL="914400" indent="0" algn="ctr" defTabSz="914400" rtl="0" eaLnBrk="1" latinLnBrk="0" hangingPunct="1">
+              <a:lnSpc>
+                <a:spcPct val="90000"/>
+              </a:lnSpc>
+              <a:spcBef>
+                <a:spcPts val="500"/>
+              </a:spcBef>
+              <a:buFont typeface="Arial" panose="020B0604020202020204" pitchFamily="34" charset="0"/>
+              <a:buNone/>
+              <a:defRPr sz="1800" kern="1200">
+                <a:solidFill>
+                  <a:schemeClr val="tx1"/>
+                </a:solidFill>
+                <a:latin typeface="+mn-lt"/>
+                <a:ea typeface="+mn-ea"/>
+                <a:cs typeface="+mn-cs"/>
+              </a:defRPr>
+            </a:lvl3pPr>
+            <a:lvl4pPr marL="1371600" indent="0" algn="ctr" defTabSz="914400" rtl="0" eaLnBrk="1" latinLnBrk="0" hangingPunct="1">
+              <a:lnSpc>
+                <a:spcPct val="90000"/>
+              </a:lnSpc>
+              <a:spcBef>
+                <a:spcPts val="500"/>
+              </a:spcBef>
+              <a:buFont typeface="Arial" panose="020B0604020202020204" pitchFamily="34" charset="0"/>
+              <a:buNone/>
+              <a:defRPr sz="1600" kern="1200">
+                <a:solidFill>
+                  <a:schemeClr val="tx1"/>
+                </a:solidFill>
+                <a:latin typeface="+mn-lt"/>
+                <a:ea typeface="+mn-ea"/>
+                <a:cs typeface="+mn-cs"/>
+              </a:defRPr>
+            </a:lvl4pPr>
+            <a:lvl5pPr marL="1828800" indent="0" algn="ctr" defTabSz="914400" rtl="0" eaLnBrk="1" latinLnBrk="0" hangingPunct="1">
+              <a:lnSpc>
+                <a:spcPct val="90000"/>
+              </a:lnSpc>
+              <a:spcBef>
+                <a:spcPts val="500"/>
+              </a:spcBef>
+              <a:buFont typeface="Arial" panose="020B0604020202020204" pitchFamily="34" charset="0"/>
+              <a:buNone/>
+              <a:defRPr sz="1600" kern="1200">
+                <a:solidFill>
+                  <a:schemeClr val="tx1"/>
+                </a:solidFill>
+                <a:latin typeface="+mn-lt"/>
+                <a:ea typeface="+mn-ea"/>
+                <a:cs typeface="+mn-cs"/>
+              </a:defRPr>
+            </a:lvl5pPr>
+            <a:lvl6pPr marL="2286000" indent="0" algn="ctr" defTabSz="914400" rtl="0" eaLnBrk="1" latinLnBrk="0" hangingPunct="1">
+              <a:lnSpc>
+                <a:spcPct val="90000"/>
+              </a:lnSpc>
+              <a:spcBef>
+                <a:spcPts val="500"/>
+              </a:spcBef>
+              <a:buFont typeface="Arial" panose="020B0604020202020204" pitchFamily="34" charset="0"/>
+              <a:buNone/>
+              <a:defRPr sz="1600" kern="1200">
+                <a:solidFill>
+                  <a:schemeClr val="tx1"/>
+                </a:solidFill>
+                <a:latin typeface="+mn-lt"/>
+                <a:ea typeface="+mn-ea"/>
+                <a:cs typeface="+mn-cs"/>
+              </a:defRPr>
+            </a:lvl6pPr>
+            <a:lvl7pPr marL="2743200" indent="0" algn="ctr" defTabSz="914400" rtl="0" eaLnBrk="1" latinLnBrk="0" hangingPunct="1">
+              <a:lnSpc>
+                <a:spcPct val="90000"/>
+              </a:lnSpc>
+              <a:spcBef>
+                <a:spcPts val="500"/>
+              </a:spcBef>
+              <a:buFont typeface="Arial" panose="020B0604020202020204" pitchFamily="34" charset="0"/>
+              <a:buNone/>
+              <a:defRPr sz="1600" kern="1200">
+                <a:solidFill>
+                  <a:schemeClr val="tx1"/>
+                </a:solidFill>
+                <a:latin typeface="+mn-lt"/>
+                <a:ea typeface="+mn-ea"/>
+                <a:cs typeface="+mn-cs"/>
+              </a:defRPr>
+            </a:lvl7pPr>
+            <a:lvl8pPr marL="3200400" indent="0" algn="ctr" defTabSz="914400" rtl="0" eaLnBrk="1" latinLnBrk="0" hangingPunct="1">
+              <a:lnSpc>
+                <a:spcPct val="90000"/>
+              </a:lnSpc>
+              <a:spcBef>
+                <a:spcPts val="500"/>
+              </a:spcBef>
+              <a:buFont typeface="Arial" panose="020B0604020202020204" pitchFamily="34" charset="0"/>
+              <a:buNone/>
+              <a:defRPr sz="1600" kern="1200">
+                <a:solidFill>
+                  <a:schemeClr val="tx1"/>
+                </a:solidFill>
+                <a:latin typeface="+mn-lt"/>
+                <a:ea typeface="+mn-ea"/>
+                <a:cs typeface="+mn-cs"/>
+              </a:defRPr>
+            </a:lvl8pPr>
+            <a:lvl9pPr marL="3657600" indent="0" algn="ctr" defTabSz="914400" rtl="0" eaLnBrk="1" latinLnBrk="0" hangingPunct="1">
+              <a:lnSpc>
+                <a:spcPct val="90000"/>
+              </a:lnSpc>
+              <a:spcBef>
+                <a:spcPts val="500"/>
+              </a:spcBef>
+              <a:buFont typeface="Arial" panose="020B0604020202020204" pitchFamily="34" charset="0"/>
+              <a:buNone/>
+              <a:defRPr sz="1600" kern="1200">
+                <a:solidFill>
+                  <a:schemeClr val="tx1"/>
+                </a:solidFill>
+                <a:latin typeface="+mn-lt"/>
+                <a:ea typeface="+mn-ea"/>
+                <a:cs typeface="+mn-cs"/>
+              </a:defRPr>
+            </a:lvl9pPr>
+          </a:lstStyle>
+          <a:p>
+            <a:pPr marL="342900" indent="-342900" algn="l">
+              <a:buFont typeface="Arial" panose="020B0604020202020204" pitchFamily="34" charset="0"/>
+              <a:buChar char="•"/>
+            </a:pPr>
+            <a:r>
+              <a:rPr lang="de-CH" dirty="0"/>
+              <a:t>Spiel ist nicht intuitiv ohne Tutorial</a:t>
+            </a:r>
+          </a:p>
+          <a:p>
+            <a:pPr marL="342900" indent="-342900" algn="l">
+              <a:buFont typeface="Arial" panose="020B0604020202020204" pitchFamily="34" charset="0"/>
+              <a:buChar char="•"/>
+            </a:pPr>
+            <a:r>
+              <a:rPr lang="de-CH" dirty="0"/>
+              <a:t>Design ist nicht einheitlich</a:t>
+            </a:r>
+          </a:p>
+          <a:p>
+            <a:pPr marL="342900" indent="-342900" algn="l">
+              <a:buFont typeface="Arial" panose="020B0604020202020204" pitchFamily="34" charset="0"/>
+              <a:buChar char="•"/>
+            </a:pPr>
+            <a:r>
+              <a:rPr lang="de-CH" dirty="0"/>
+              <a:t>Abstimmung von Honig, Geld und Kosten von Gegenständen muss verbessert werden</a:t>
+            </a:r>
+          </a:p>
+          <a:p>
+            <a:pPr marL="342900" indent="-342900" algn="l">
+              <a:buFont typeface="Arial" panose="020B0604020202020204" pitchFamily="34" charset="0"/>
+              <a:buChar char="•"/>
+            </a:pPr>
+            <a:r>
+              <a:rPr lang="de-CH" dirty="0"/>
+              <a:t>Mülleimer für Abbruch des Drag/Drop</a:t>
+            </a:r>
+          </a:p>
+          <a:p>
+            <a:pPr marL="342900" indent="-342900" algn="l">
+              <a:buFont typeface="Arial" panose="020B0604020202020204" pitchFamily="34" charset="0"/>
+              <a:buChar char="•"/>
+            </a:pPr>
+            <a:endParaRPr lang="de-CH" dirty="0"/>
+          </a:p>
+          <a:p>
+            <a:pPr marL="342900" indent="-342900" algn="l">
+              <a:buFont typeface="Arial" panose="020B0604020202020204" pitchFamily="34" charset="0"/>
+              <a:buChar char="•"/>
+            </a:pPr>
+            <a:endParaRPr lang="en-CH" dirty="0"/>
+          </a:p>
+        </p:txBody>
+      </p:sp>
+      <p:sp>
+        <p:nvSpPr>
+          <p:cNvPr id="22" name="Slide Number Placeholder 3">
+            <a:extLst>
+              <a:ext uri="{FF2B5EF4-FFF2-40B4-BE49-F238E27FC236}">
+                <a16:creationId xmlns:a16="http://schemas.microsoft.com/office/drawing/2014/main" id="{30CC832F-1DF6-496C-AEBF-2FE46D26053A}"/>
+              </a:ext>
+            </a:extLst>
+          </p:cNvPr>
+          <p:cNvSpPr>
+            <a:spLocks noGrp="1"/>
+          </p:cNvSpPr>
+          <p:nvPr>
+            <p:ph type="sldNum" sz="quarter" idx="12"/>
+          </p:nvPr>
+        </p:nvSpPr>
+        <p:spPr>
+          <a:xfrm>
+            <a:off x="9054547" y="6386167"/>
+            <a:ext cx="2743200" cy="365125"/>
+          </a:xfrm>
+        </p:spPr>
+        <p:txBody>
+          <a:bodyPr/>
+          <a:lstStyle/>
+          <a:p>
+            <a:r>
+              <a:rPr lang="de-CH" sz="1800" dirty="0"/>
+              <a:t>Seite </a:t>
+            </a:r>
+            <a:fld id="{AA18215A-2065-42F3-B327-F66581BA1A17}" type="slidenum">
+              <a:rPr lang="en-CH" sz="1800" smtClean="0"/>
+              <a:t>9</a:t>
+            </a:fld>
+            <a:endParaRPr lang="en-CH" sz="1800" dirty="0"/>
+          </a:p>
+        </p:txBody>
+      </p:sp>
+      <p:pic>
+        <p:nvPicPr>
+          <p:cNvPr id="23" name="Picture 22">
+            <a:extLst>
+              <a:ext uri="{FF2B5EF4-FFF2-40B4-BE49-F238E27FC236}">
+                <a16:creationId xmlns:a16="http://schemas.microsoft.com/office/drawing/2014/main" id="{4E44345A-3A23-48FA-B43E-E7C6ED41FBEE}"/>
+              </a:ext>
+            </a:extLst>
+          </p:cNvPr>
+          <p:cNvPicPr>
+            <a:picLocks noChangeAspect="1"/>
+          </p:cNvPicPr>
+          <p:nvPr/>
+        </p:nvPicPr>
+        <p:blipFill rotWithShape="1">
+          <a:blip r:embed="rId3" cstate="hqprint">
+            <a:extLst>
+              <a:ext uri="{28A0092B-C50C-407E-A947-70E740481C1C}">
+                <a14:useLocalDpi xmlns:a14="http://schemas.microsoft.com/office/drawing/2010/main" val="0"/>
+              </a:ext>
+            </a:extLst>
+          </a:blip>
+          <a:srcRect l="12899" t="12899" r="12899" b="12899"/>
+          <a:stretch/>
+        </p:blipFill>
+        <p:spPr>
+          <a:xfrm flipH="1">
+            <a:off x="10426147" y="16496"/>
+            <a:ext cx="1765852" cy="1802225"/>
+          </a:xfrm>
+          <a:prstGeom prst="rect">
+            <a:avLst/>
+          </a:prstGeom>
+        </p:spPr>
+      </p:pic>
+      <p:sp>
+        <p:nvSpPr>
+          <p:cNvPr id="26" name="Slide Number Placeholder 3">
+            <a:extLst>
+              <a:ext uri="{FF2B5EF4-FFF2-40B4-BE49-F238E27FC236}">
+                <a16:creationId xmlns:a16="http://schemas.microsoft.com/office/drawing/2014/main" id="{0AE2B8A8-6598-4EDB-A8D4-B1AF00F1151E}"/>
+              </a:ext>
+            </a:extLst>
+          </p:cNvPr>
+          <p:cNvSpPr txBox="1">
+            <a:spLocks/>
+          </p:cNvSpPr>
+          <p:nvPr/>
+        </p:nvSpPr>
+        <p:spPr>
+          <a:xfrm>
+            <a:off x="0" y="-1027"/>
+            <a:ext cx="3170981" cy="365125"/>
+          </a:xfrm>
+          <a:prstGeom prst="rect">
+            <a:avLst/>
+          </a:prstGeom>
+        </p:spPr>
+        <p:txBody>
+          <a:bodyPr vert="horz" lIns="91440" tIns="45720" rIns="91440" bIns="45720" rtlCol="0" anchor="ctr"/>
+          <a:lstStyle>
+            <a:defPPr>
+              <a:defRPr lang="en-CH"/>
+            </a:defPPr>
+            <a:lvl1pPr marL="0" algn="r" defTabSz="914400" rtl="0" eaLnBrk="1" latinLnBrk="0" hangingPunct="1">
+              <a:defRPr sz="1200" kern="1200">
+                <a:solidFill>
+                  <a:schemeClr val="tx1">
+                    <a:tint val="75000"/>
+                  </a:schemeClr>
+                </a:solidFill>
+                <a:latin typeface="+mn-lt"/>
+                <a:ea typeface="+mn-ea"/>
+                <a:cs typeface="+mn-cs"/>
+              </a:defRPr>
+            </a:lvl1pPr>
+            <a:lvl2pPr marL="457200" algn="l" defTabSz="914400" rtl="0" eaLnBrk="1" latinLnBrk="0" hangingPunct="1">
+              <a:defRPr sz="1800" kern="1200">
+                <a:solidFill>
+                  <a:schemeClr val="tx1"/>
+                </a:solidFill>
+                <a:latin typeface="+mn-lt"/>
+                <a:ea typeface="+mn-ea"/>
+                <a:cs typeface="+mn-cs"/>
+              </a:defRPr>
+            </a:lvl2pPr>
+            <a:lvl3pPr marL="914400" algn="l" defTabSz="914400" rtl="0" eaLnBrk="1" latinLnBrk="0" hangingPunct="1">
+              <a:defRPr sz="1800" kern="1200">
+                <a:solidFill>
+                  <a:schemeClr val="tx1"/>
+                </a:solidFill>
+                <a:latin typeface="+mn-lt"/>
+                <a:ea typeface="+mn-ea"/>
+                <a:cs typeface="+mn-cs"/>
+              </a:defRPr>
+            </a:lvl3pPr>
+            <a:lvl4pPr marL="1371600" algn="l" defTabSz="914400" rtl="0" eaLnBrk="1" latinLnBrk="0" hangingPunct="1">
+              <a:defRPr sz="1800" kern="1200">
+                <a:solidFill>
+                  <a:schemeClr val="tx1"/>
+                </a:solidFill>
+                <a:latin typeface="+mn-lt"/>
+                <a:ea typeface="+mn-ea"/>
+                <a:cs typeface="+mn-cs"/>
+              </a:defRPr>
+            </a:lvl4pPr>
+            <a:lvl5pPr marL="1828800" algn="l" defTabSz="914400" rtl="0" eaLnBrk="1" latinLnBrk="0" hangingPunct="1">
+              <a:defRPr sz="1800" kern="1200">
+                <a:solidFill>
+                  <a:schemeClr val="tx1"/>
+                </a:solidFill>
+                <a:latin typeface="+mn-lt"/>
+                <a:ea typeface="+mn-ea"/>
+                <a:cs typeface="+mn-cs"/>
+              </a:defRPr>
+            </a:lvl5pPr>
+            <a:lvl6pPr marL="2286000" algn="l" defTabSz="914400" rtl="0" eaLnBrk="1" latinLnBrk="0" hangingPunct="1">
+              <a:defRPr sz="1800" kern="1200">
+                <a:solidFill>
+                  <a:schemeClr val="tx1"/>
+                </a:solidFill>
+                <a:latin typeface="+mn-lt"/>
+                <a:ea typeface="+mn-ea"/>
+                <a:cs typeface="+mn-cs"/>
+              </a:defRPr>
+            </a:lvl6pPr>
+            <a:lvl7pPr marL="2743200" algn="l" defTabSz="914400" rtl="0" eaLnBrk="1" latinLnBrk="0" hangingPunct="1">
+              <a:defRPr sz="1800" kern="1200">
+                <a:solidFill>
+                  <a:schemeClr val="tx1"/>
+                </a:solidFill>
+                <a:latin typeface="+mn-lt"/>
+                <a:ea typeface="+mn-ea"/>
+                <a:cs typeface="+mn-cs"/>
+              </a:defRPr>
+            </a:lvl7pPr>
+            <a:lvl8pPr marL="3200400" algn="l" defTabSz="914400" rtl="0" eaLnBrk="1" latinLnBrk="0" hangingPunct="1">
+              <a:defRPr sz="1800" kern="1200">
+                <a:solidFill>
+                  <a:schemeClr val="tx1"/>
+                </a:solidFill>
+                <a:latin typeface="+mn-lt"/>
+                <a:ea typeface="+mn-ea"/>
+                <a:cs typeface="+mn-cs"/>
+              </a:defRPr>
+            </a:lvl8pPr>
+            <a:lvl9pPr marL="3657600" algn="l" defTabSz="914400" rtl="0" eaLnBrk="1" latinLnBrk="0" hangingPunct="1">
+              <a:defRPr sz="1800" kern="1200">
+                <a:solidFill>
+                  <a:schemeClr val="tx1"/>
+                </a:solidFill>
+                <a:latin typeface="+mn-lt"/>
+                <a:ea typeface="+mn-ea"/>
+                <a:cs typeface="+mn-cs"/>
+              </a:defRPr>
+            </a:lvl9pPr>
+          </a:lstStyle>
+          <a:p>
+            <a:r>
+              <a:rPr lang="de-CH" sz="1800" dirty="0"/>
+              <a:t>Präsentation – Usability Tests</a:t>
+            </a:r>
+            <a:endParaRPr lang="en-CH" sz="1800" dirty="0"/>
+          </a:p>
+        </p:txBody>
+      </p:sp>
+    </p:spTree>
+    <p:extLst>
+      <p:ext uri="{BB962C8B-B14F-4D97-AF65-F5344CB8AC3E}">
+        <p14:creationId xmlns:p14="http://schemas.microsoft.com/office/powerpoint/2010/main" val="2471354868"/>
       </p:ext>
     </p:extLst>
   </p:cSld>

</xml_diff>